<commit_message>
Science evolution slide added
</commit_message>
<xml_diff>
--- a/instructors/OS_Episode_v1.0.pptx
+++ b/instructors/OS_Episode_v1.0.pptx
@@ -6,29 +6,30 @@
   </p:sldMasterIdLst>
   <p:sldIdLst>
     <p:sldId id="256" r:id="rId2"/>
-    <p:sldId id="258" r:id="rId3"/>
-    <p:sldId id="320" r:id="rId4"/>
-    <p:sldId id="321" r:id="rId5"/>
-    <p:sldId id="261" r:id="rId6"/>
-    <p:sldId id="259" r:id="rId7"/>
-    <p:sldId id="257" r:id="rId8"/>
-    <p:sldId id="262" r:id="rId9"/>
-    <p:sldId id="322" r:id="rId10"/>
-    <p:sldId id="263" r:id="rId11"/>
-    <p:sldId id="311" r:id="rId12"/>
-    <p:sldId id="309" r:id="rId13"/>
-    <p:sldId id="310" r:id="rId14"/>
-    <p:sldId id="312" r:id="rId15"/>
-    <p:sldId id="313" r:id="rId16"/>
-    <p:sldId id="323" r:id="rId17"/>
-    <p:sldId id="325" r:id="rId18"/>
-    <p:sldId id="324" r:id="rId19"/>
-    <p:sldId id="314" r:id="rId20"/>
-    <p:sldId id="316" r:id="rId21"/>
-    <p:sldId id="315" r:id="rId22"/>
-    <p:sldId id="318" r:id="rId23"/>
-    <p:sldId id="326" r:id="rId24"/>
-    <p:sldId id="319" r:id="rId25"/>
+    <p:sldId id="321" r:id="rId3"/>
+    <p:sldId id="327" r:id="rId4"/>
+    <p:sldId id="258" r:id="rId5"/>
+    <p:sldId id="320" r:id="rId6"/>
+    <p:sldId id="261" r:id="rId7"/>
+    <p:sldId id="259" r:id="rId8"/>
+    <p:sldId id="257" r:id="rId9"/>
+    <p:sldId id="262" r:id="rId10"/>
+    <p:sldId id="322" r:id="rId11"/>
+    <p:sldId id="263" r:id="rId12"/>
+    <p:sldId id="311" r:id="rId13"/>
+    <p:sldId id="309" r:id="rId14"/>
+    <p:sldId id="310" r:id="rId15"/>
+    <p:sldId id="312" r:id="rId16"/>
+    <p:sldId id="313" r:id="rId17"/>
+    <p:sldId id="323" r:id="rId18"/>
+    <p:sldId id="325" r:id="rId19"/>
+    <p:sldId id="324" r:id="rId20"/>
+    <p:sldId id="314" r:id="rId21"/>
+    <p:sldId id="316" r:id="rId22"/>
+    <p:sldId id="315" r:id="rId23"/>
+    <p:sldId id="318" r:id="rId24"/>
+    <p:sldId id="326" r:id="rId25"/>
+    <p:sldId id="319" r:id="rId26"/>
   </p:sldIdLst>
   <p:sldSz cx="12192000" cy="6858000"/>
   <p:notesSz cx="6858000" cy="9144000"/>
@@ -284,7 +285,7 @@
           <a:p>
             <a:fld id="{41BDB93A-9A91-4ACD-99A9-997668C686B7}" type="datetimeFigureOut">
               <a:rPr lang="en-GB" smtClean="0"/>
-              <a:t>09/06/2021</a:t>
+              <a:t>28/09/2021</a:t>
             </a:fld>
             <a:endParaRPr lang="en-GB"/>
           </a:p>
@@ -484,7 +485,7 @@
           <a:p>
             <a:fld id="{41BDB93A-9A91-4ACD-99A9-997668C686B7}" type="datetimeFigureOut">
               <a:rPr lang="en-GB" smtClean="0"/>
-              <a:t>09/06/2021</a:t>
+              <a:t>28/09/2021</a:t>
             </a:fld>
             <a:endParaRPr lang="en-GB"/>
           </a:p>
@@ -694,7 +695,7 @@
           <a:p>
             <a:fld id="{41BDB93A-9A91-4ACD-99A9-997668C686B7}" type="datetimeFigureOut">
               <a:rPr lang="en-GB" smtClean="0"/>
-              <a:t>09/06/2021</a:t>
+              <a:t>28/09/2021</a:t>
             </a:fld>
             <a:endParaRPr lang="en-GB"/>
           </a:p>
@@ -894,7 +895,7 @@
           <a:p>
             <a:fld id="{41BDB93A-9A91-4ACD-99A9-997668C686B7}" type="datetimeFigureOut">
               <a:rPr lang="en-GB" smtClean="0"/>
-              <a:t>09/06/2021</a:t>
+              <a:t>28/09/2021</a:t>
             </a:fld>
             <a:endParaRPr lang="en-GB"/>
           </a:p>
@@ -1170,7 +1171,7 @@
           <a:p>
             <a:fld id="{41BDB93A-9A91-4ACD-99A9-997668C686B7}" type="datetimeFigureOut">
               <a:rPr lang="en-GB" smtClean="0"/>
-              <a:t>09/06/2021</a:t>
+              <a:t>28/09/2021</a:t>
             </a:fld>
             <a:endParaRPr lang="en-GB"/>
           </a:p>
@@ -1438,7 +1439,7 @@
           <a:p>
             <a:fld id="{41BDB93A-9A91-4ACD-99A9-997668C686B7}" type="datetimeFigureOut">
               <a:rPr lang="en-GB" smtClean="0"/>
-              <a:t>09/06/2021</a:t>
+              <a:t>28/09/2021</a:t>
             </a:fld>
             <a:endParaRPr lang="en-GB"/>
           </a:p>
@@ -1853,7 +1854,7 @@
           <a:p>
             <a:fld id="{41BDB93A-9A91-4ACD-99A9-997668C686B7}" type="datetimeFigureOut">
               <a:rPr lang="en-GB" smtClean="0"/>
-              <a:t>09/06/2021</a:t>
+              <a:t>28/09/2021</a:t>
             </a:fld>
             <a:endParaRPr lang="en-GB"/>
           </a:p>
@@ -1995,7 +1996,7 @@
           <a:p>
             <a:fld id="{41BDB93A-9A91-4ACD-99A9-997668C686B7}" type="datetimeFigureOut">
               <a:rPr lang="en-GB" smtClean="0"/>
-              <a:t>09/06/2021</a:t>
+              <a:t>28/09/2021</a:t>
             </a:fld>
             <a:endParaRPr lang="en-GB"/>
           </a:p>
@@ -2108,7 +2109,7 @@
           <a:p>
             <a:fld id="{41BDB93A-9A91-4ACD-99A9-997668C686B7}" type="datetimeFigureOut">
               <a:rPr lang="en-GB" smtClean="0"/>
-              <a:t>09/06/2021</a:t>
+              <a:t>28/09/2021</a:t>
             </a:fld>
             <a:endParaRPr lang="en-GB"/>
           </a:p>
@@ -2421,7 +2422,7 @@
           <a:p>
             <a:fld id="{41BDB93A-9A91-4ACD-99A9-997668C686B7}" type="datetimeFigureOut">
               <a:rPr lang="en-GB" smtClean="0"/>
-              <a:t>09/06/2021</a:t>
+              <a:t>28/09/2021</a:t>
             </a:fld>
             <a:endParaRPr lang="en-GB"/>
           </a:p>
@@ -2710,7 +2711,7 @@
           <a:p>
             <a:fld id="{41BDB93A-9A91-4ACD-99A9-997668C686B7}" type="datetimeFigureOut">
               <a:rPr lang="en-GB" smtClean="0"/>
-              <a:t>09/06/2021</a:t>
+              <a:t>28/09/2021</a:t>
             </a:fld>
             <a:endParaRPr lang="en-GB"/>
           </a:p>
@@ -2953,7 +2954,7 @@
           <a:p>
             <a:fld id="{41BDB93A-9A91-4ACD-99A9-997668C686B7}" type="datetimeFigureOut">
               <a:rPr lang="en-GB" smtClean="0"/>
-              <a:t>09/06/2021</a:t>
+              <a:t>28/09/2021</a:t>
             </a:fld>
             <a:endParaRPr lang="en-GB"/>
           </a:p>
@@ -3433,6 +3434,13 @@
   <p:clrMapOvr>
     <a:masterClrMapping/>
   </p:clrMapOvr>
+  <p:timing>
+    <p:tnLst>
+      <p:par>
+        <p:cTn id="1" dur="indefinite" restart="never" nodeType="tmRoot"/>
+      </p:par>
+    </p:tnLst>
+  </p:timing>
 </p:sld>
 </file>
 
@@ -3458,7 +3466,7 @@
           <p:cNvPr id="2" name="Title 1">
             <a:extLst>
               <a:ext uri="{FF2B5EF4-FFF2-40B4-BE49-F238E27FC236}">
-                <a16:creationId xmlns:a16="http://schemas.microsoft.com/office/drawing/2014/main" id="{917BA876-9561-462B-89F2-FFD0BB8C58F1}"/>
+                <a16:creationId xmlns:a16="http://schemas.microsoft.com/office/drawing/2014/main" id="{BA9DA74F-73B3-421A-BD2A-363B267769ED}"/>
               </a:ext>
             </a:extLst>
           </p:cNvPr>
@@ -3475,8 +3483,12 @@
           <a:lstStyle/>
           <a:p>
             <a:r>
-              <a:rPr lang="en-GB" dirty="0"/>
-              <a:t>Open Science motivation: Money</a:t>
+              <a:rPr lang="pl-PL" dirty="0"/>
+              <a:t>Outcomes</a:t>
+            </a:r>
+            <a:r>
+              <a:rPr lang="en-GB" dirty="0"/>
+              <a:t> of Openness</a:t>
             </a:r>
           </a:p>
         </p:txBody>
@@ -3486,7 +3498,7 @@
           <p:cNvPr id="3" name="Content Placeholder 2">
             <a:extLst>
               <a:ext uri="{FF2B5EF4-FFF2-40B4-BE49-F238E27FC236}">
-                <a16:creationId xmlns:a16="http://schemas.microsoft.com/office/drawing/2014/main" id="{32BDDAC9-35A8-4328-B5EA-8844C448EBC3}"/>
+                <a16:creationId xmlns:a16="http://schemas.microsoft.com/office/drawing/2014/main" id="{D7A3F2CD-AB38-44C7-977C-EDF39BD02DB3}"/>
               </a:ext>
             </a:extLst>
           </p:cNvPr>
@@ -3500,17 +3512,65 @@
         <p:spPr/>
         <p:txBody>
           <a:bodyPr>
-            <a:normAutofit lnSpcReduction="10000"/>
+            <a:normAutofit/>
           </a:bodyPr>
           <a:lstStyle/>
           <a:p>
-            <a:pPr marL="0" indent="0">
-              <a:buNone/>
-            </a:pPr>
-            <a:r>
-              <a:rPr lang="en-GB" dirty="0"/>
-              <a:t>Scientific knowledge is a product of social collaboration and its ownership belongs to the community. </a:t>
-            </a:r>
+            <a:r>
+              <a:rPr lang="pl-PL" dirty="0"/>
+              <a:t>Collaboration</a:t>
+            </a:r>
+          </a:p>
+          <a:p>
+            <a:r>
+              <a:rPr lang="pl-PL" dirty="0"/>
+              <a:t>Speed</a:t>
+            </a:r>
+          </a:p>
+          <a:p>
+            <a:r>
+              <a:rPr lang="pl-PL" dirty="0" err="1"/>
+              <a:t>Unpulished</a:t>
+            </a:r>
+            <a:r>
+              <a:rPr lang="pl-PL" dirty="0"/>
+              <a:t>/</a:t>
+            </a:r>
+            <a:r>
+              <a:rPr lang="pl-PL" dirty="0" err="1"/>
+              <a:t>negative</a:t>
+            </a:r>
+            <a:r>
+              <a:rPr lang="pl-PL" dirty="0"/>
+              <a:t> results</a:t>
+            </a:r>
+          </a:p>
+          <a:p>
+            <a:r>
+              <a:rPr lang="pl-PL" dirty="0"/>
+              <a:t>Re-use</a:t>
+            </a:r>
+          </a:p>
+          <a:p>
+            <a:r>
+              <a:rPr lang="pl-PL" dirty="0"/>
+              <a:t>Learn by example</a:t>
+            </a:r>
+          </a:p>
+          <a:p>
+            <a:r>
+              <a:rPr lang="pl-PL" dirty="0"/>
+              <a:t>Feedback</a:t>
+            </a:r>
+          </a:p>
+          <a:p>
+            <a:endParaRPr lang="pl-PL" dirty="0"/>
+          </a:p>
+          <a:p>
+            <a:endParaRPr lang="pl-PL" dirty="0"/>
+          </a:p>
+          <a:p>
+            <a:endParaRPr lang="pl-PL" dirty="0"/>
           </a:p>
           <a:p>
             <a:pPr marL="0" indent="0">
@@ -3519,55 +3579,14 @@
             <a:endParaRPr lang="en-GB" dirty="0"/>
           </a:p>
           <a:p>
-            <a:pPr marL="0" indent="0">
-              <a:buNone/>
-            </a:pPr>
-            <a:r>
-              <a:rPr lang="en-GB" dirty="0"/>
-              <a:t>From an economic point of view, scientific outputs generated by public research are a public good that everyone should be able to use at no cost.</a:t>
-            </a:r>
-          </a:p>
-          <a:p>
-            <a:pPr marL="0" indent="0">
-              <a:buNone/>
-            </a:pPr>
             <a:endParaRPr lang="en-GB" dirty="0"/>
-          </a:p>
-          <a:p>
-            <a:pPr marL="0" indent="0">
-              <a:buNone/>
-            </a:pPr>
-            <a:r>
-              <a:rPr lang="en-GB" dirty="0"/>
-              <a:t>€10.2bn lost every year because of not accessible data</a:t>
-            </a:r>
-            <a:br>
-              <a:rPr lang="en-GB" dirty="0"/>
-            </a:br>
-            <a:r>
-              <a:rPr lang="en-GB" dirty="0"/>
-              <a:t>(plus additional 16bn if accounting for re-use and research quality).</a:t>
-            </a:r>
-            <a:br>
-              <a:rPr lang="en-GB" dirty="0"/>
-            </a:br>
-            <a:endParaRPr lang="en-GB" sz="1600" dirty="0"/>
-          </a:p>
-          <a:p>
-            <a:pPr marL="0" indent="0">
-              <a:buNone/>
-            </a:pPr>
-            <a:r>
-              <a:rPr lang="en-GB" sz="1600" dirty="0"/>
-              <a:t>Source: Credits [2]</a:t>
-            </a:r>
           </a:p>
         </p:txBody>
       </p:sp>
     </p:spTree>
     <p:extLst>
       <p:ext uri="{BB962C8B-B14F-4D97-AF65-F5344CB8AC3E}">
-        <p14:creationId xmlns:p14="http://schemas.microsoft.com/office/powerpoint/2010/main" val="3400150690"/>
+        <p14:creationId xmlns:p14="http://schemas.microsoft.com/office/powerpoint/2010/main" val="3667307836"/>
       </p:ext>
     </p:extLst>
   </p:cSld>
@@ -3599,6 +3618,147 @@
           <p:cNvPr id="2" name="Title 1">
             <a:extLst>
               <a:ext uri="{FF2B5EF4-FFF2-40B4-BE49-F238E27FC236}">
+                <a16:creationId xmlns:a16="http://schemas.microsoft.com/office/drawing/2014/main" id="{917BA876-9561-462B-89F2-FFD0BB8C58F1}"/>
+              </a:ext>
+            </a:extLst>
+          </p:cNvPr>
+          <p:cNvSpPr>
+            <a:spLocks noGrp="1"/>
+          </p:cNvSpPr>
+          <p:nvPr>
+            <p:ph type="title"/>
+          </p:nvPr>
+        </p:nvSpPr>
+        <p:spPr/>
+        <p:txBody>
+          <a:bodyPr/>
+          <a:lstStyle/>
+          <a:p>
+            <a:r>
+              <a:rPr lang="en-GB" dirty="0"/>
+              <a:t>Open Science motivation: Money</a:t>
+            </a:r>
+          </a:p>
+        </p:txBody>
+      </p:sp>
+      <p:sp>
+        <p:nvSpPr>
+          <p:cNvPr id="3" name="Content Placeholder 2">
+            <a:extLst>
+              <a:ext uri="{FF2B5EF4-FFF2-40B4-BE49-F238E27FC236}">
+                <a16:creationId xmlns:a16="http://schemas.microsoft.com/office/drawing/2014/main" id="{32BDDAC9-35A8-4328-B5EA-8844C448EBC3}"/>
+              </a:ext>
+            </a:extLst>
+          </p:cNvPr>
+          <p:cNvSpPr>
+            <a:spLocks noGrp="1"/>
+          </p:cNvSpPr>
+          <p:nvPr>
+            <p:ph idx="1"/>
+          </p:nvPr>
+        </p:nvSpPr>
+        <p:spPr/>
+        <p:txBody>
+          <a:bodyPr>
+            <a:normAutofit lnSpcReduction="10000"/>
+          </a:bodyPr>
+          <a:lstStyle/>
+          <a:p>
+            <a:pPr marL="0" indent="0">
+              <a:buNone/>
+            </a:pPr>
+            <a:r>
+              <a:rPr lang="en-GB" dirty="0"/>
+              <a:t>Scientific knowledge is a product of social collaboration and its ownership belongs to the community. </a:t>
+            </a:r>
+          </a:p>
+          <a:p>
+            <a:pPr marL="0" indent="0">
+              <a:buNone/>
+            </a:pPr>
+            <a:endParaRPr lang="en-GB" dirty="0"/>
+          </a:p>
+          <a:p>
+            <a:pPr marL="0" indent="0">
+              <a:buNone/>
+            </a:pPr>
+            <a:r>
+              <a:rPr lang="en-GB" dirty="0"/>
+              <a:t>From an economic point of view, scientific outputs generated by public research are a public good that everyone should be able to use at no cost.</a:t>
+            </a:r>
+          </a:p>
+          <a:p>
+            <a:pPr marL="0" indent="0">
+              <a:buNone/>
+            </a:pPr>
+            <a:endParaRPr lang="en-GB" dirty="0"/>
+          </a:p>
+          <a:p>
+            <a:pPr marL="0" indent="0">
+              <a:buNone/>
+            </a:pPr>
+            <a:r>
+              <a:rPr lang="en-GB" dirty="0"/>
+              <a:t>€10.2bn lost every year because of not accessible data</a:t>
+            </a:r>
+            <a:br>
+              <a:rPr lang="en-GB" dirty="0"/>
+            </a:br>
+            <a:r>
+              <a:rPr lang="en-GB" dirty="0"/>
+              <a:t>(plus additional 16bn if accounting for re-use and research quality).</a:t>
+            </a:r>
+            <a:br>
+              <a:rPr lang="en-GB" dirty="0"/>
+            </a:br>
+            <a:endParaRPr lang="en-GB" sz="1600" dirty="0"/>
+          </a:p>
+          <a:p>
+            <a:pPr marL="0" indent="0">
+              <a:buNone/>
+            </a:pPr>
+            <a:r>
+              <a:rPr lang="en-GB" sz="1600" dirty="0"/>
+              <a:t>Source: Credits [2]</a:t>
+            </a:r>
+          </a:p>
+        </p:txBody>
+      </p:sp>
+    </p:spTree>
+    <p:extLst>
+      <p:ext uri="{BB962C8B-B14F-4D97-AF65-F5344CB8AC3E}">
+        <p14:creationId xmlns:p14="http://schemas.microsoft.com/office/powerpoint/2010/main" val="3400150690"/>
+      </p:ext>
+    </p:extLst>
+  </p:cSld>
+  <p:clrMapOvr>
+    <a:masterClrMapping/>
+  </p:clrMapOvr>
+</p:sld>
+</file>
+
+<file path=ppt/slides/slide12.xml><?xml version="1.0" encoding="utf-8"?>
+<p:sld xmlns:a="http://schemas.openxmlformats.org/drawingml/2006/main" xmlns:r="http://schemas.openxmlformats.org/officeDocument/2006/relationships" xmlns:p="http://schemas.openxmlformats.org/presentationml/2006/main">
+  <p:cSld>
+    <p:spTree>
+      <p:nvGrpSpPr>
+        <p:cNvPr id="1" name=""/>
+        <p:cNvGrpSpPr/>
+        <p:nvPr/>
+      </p:nvGrpSpPr>
+      <p:grpSpPr>
+        <a:xfrm>
+          <a:off x="0" y="0"/>
+          <a:ext cx="0" cy="0"/>
+          <a:chOff x="0" y="0"/>
+          <a:chExt cx="0" cy="0"/>
+        </a:xfrm>
+      </p:grpSpPr>
+      <p:sp>
+        <p:nvSpPr>
+          <p:cNvPr id="2" name="Title 1">
+            <a:extLst>
+              <a:ext uri="{FF2B5EF4-FFF2-40B4-BE49-F238E27FC236}">
                 <a16:creationId xmlns:a16="http://schemas.microsoft.com/office/drawing/2014/main" id="{ECA7A994-C089-42CD-8B95-C23459559029}"/>
               </a:ext>
             </a:extLst>
@@ -3783,7 +3943,7 @@
 </p:sld>
 </file>
 
-<file path=ppt/slides/slide12.xml><?xml version="1.0" encoding="utf-8"?>
+<file path=ppt/slides/slide13.xml><?xml version="1.0" encoding="utf-8"?>
 <p:sld xmlns:a="http://schemas.openxmlformats.org/drawingml/2006/main" xmlns:r="http://schemas.openxmlformats.org/officeDocument/2006/relationships" xmlns:p="http://schemas.openxmlformats.org/presentationml/2006/main">
   <p:cSld>
     <p:spTree>
@@ -4056,133 +4216,6 @@
 </p:sld>
 </file>
 
-<file path=ppt/slides/slide13.xml><?xml version="1.0" encoding="utf-8"?>
-<p:sld xmlns:a="http://schemas.openxmlformats.org/drawingml/2006/main" xmlns:r="http://schemas.openxmlformats.org/officeDocument/2006/relationships" xmlns:p="http://schemas.openxmlformats.org/presentationml/2006/main">
-  <p:cSld>
-    <p:spTree>
-      <p:nvGrpSpPr>
-        <p:cNvPr id="1" name=""/>
-        <p:cNvGrpSpPr/>
-        <p:nvPr/>
-      </p:nvGrpSpPr>
-      <p:grpSpPr>
-        <a:xfrm>
-          <a:off x="0" y="0"/>
-          <a:ext cx="0" cy="0"/>
-          <a:chOff x="0" y="0"/>
-          <a:chExt cx="0" cy="0"/>
-        </a:xfrm>
-      </p:grpSpPr>
-      <p:sp>
-        <p:nvSpPr>
-          <p:cNvPr id="2" name="Title 1">
-            <a:extLst>
-              <a:ext uri="{FF2B5EF4-FFF2-40B4-BE49-F238E27FC236}">
-                <a16:creationId xmlns:a16="http://schemas.microsoft.com/office/drawing/2014/main" id="{ECA7A994-C089-42CD-8B95-C23459559029}"/>
-              </a:ext>
-            </a:extLst>
-          </p:cNvPr>
-          <p:cNvSpPr>
-            <a:spLocks noGrp="1"/>
-          </p:cNvSpPr>
-          <p:nvPr>
-            <p:ph type="title"/>
-          </p:nvPr>
-        </p:nvSpPr>
-        <p:spPr/>
-        <p:txBody>
-          <a:bodyPr/>
-          <a:lstStyle/>
-          <a:p>
-            <a:r>
-              <a:rPr lang="en-GB" dirty="0"/>
-              <a:t>Motivation</a:t>
-            </a:r>
-          </a:p>
-        </p:txBody>
-      </p:sp>
-      <p:sp>
-        <p:nvSpPr>
-          <p:cNvPr id="3" name="Content Placeholder 2">
-            <a:extLst>
-              <a:ext uri="{FF2B5EF4-FFF2-40B4-BE49-F238E27FC236}">
-                <a16:creationId xmlns:a16="http://schemas.microsoft.com/office/drawing/2014/main" id="{042518E7-2BC9-4C7D-A75B-C2FBC33E1E6B}"/>
-              </a:ext>
-            </a:extLst>
-          </p:cNvPr>
-          <p:cNvSpPr>
-            <a:spLocks noGrp="1"/>
-          </p:cNvSpPr>
-          <p:nvPr>
-            <p:ph idx="1"/>
-          </p:nvPr>
-        </p:nvSpPr>
-        <p:spPr/>
-        <p:txBody>
-          <a:bodyPr/>
-          <a:lstStyle/>
-          <a:p>
-            <a:pPr marL="0" indent="0">
-              <a:buNone/>
-            </a:pPr>
-            <a:r>
-              <a:rPr lang="en-GB" dirty="0"/>
-              <a:t>“stick”</a:t>
-            </a:r>
-          </a:p>
-          <a:p>
-            <a:r>
-              <a:rPr lang="en-GB" dirty="0"/>
-              <a:t>Large UK funding bodies such as The </a:t>
-            </a:r>
-            <a:r>
-              <a:rPr lang="en-GB" dirty="0" err="1"/>
-              <a:t>Wellcome</a:t>
-            </a:r>
-            <a:r>
-              <a:rPr lang="en-GB" dirty="0"/>
-              <a:t> Trust are big supporters of Open Science</a:t>
-            </a:r>
-          </a:p>
-          <a:p>
-            <a:endParaRPr lang="en-GB" dirty="0"/>
-          </a:p>
-          <a:p>
-            <a:pPr marL="0" indent="0">
-              <a:buNone/>
-            </a:pPr>
-            <a:r>
-              <a:rPr lang="en-GB" dirty="0"/>
-              <a:t>“carrot”</a:t>
-            </a:r>
-          </a:p>
-          <a:p>
-            <a:pPr marL="0" indent="0">
-              <a:buNone/>
-            </a:pPr>
-            <a:r>
-              <a:rPr lang="en-GB" dirty="0"/>
-              <a:t>….</a:t>
-            </a:r>
-          </a:p>
-          <a:p>
-            <a:endParaRPr lang="en-GB" dirty="0"/>
-          </a:p>
-        </p:txBody>
-      </p:sp>
-    </p:spTree>
-    <p:extLst>
-      <p:ext uri="{BB962C8B-B14F-4D97-AF65-F5344CB8AC3E}">
-        <p14:creationId xmlns:p14="http://schemas.microsoft.com/office/powerpoint/2010/main" val="2787703030"/>
-      </p:ext>
-    </p:extLst>
-  </p:cSld>
-  <p:clrMapOvr>
-    <a:masterClrMapping/>
-  </p:clrMapOvr>
-</p:sld>
-</file>
-
 <file path=ppt/slides/slide14.xml><?xml version="1.0" encoding="utf-8"?>
 <p:sld xmlns:a="http://schemas.openxmlformats.org/drawingml/2006/main" xmlns:r="http://schemas.openxmlformats.org/officeDocument/2006/relationships" xmlns:p="http://schemas.openxmlformats.org/presentationml/2006/main">
   <p:cSld>
@@ -4205,7 +4238,7 @@
           <p:cNvPr id="2" name="Title 1">
             <a:extLst>
               <a:ext uri="{FF2B5EF4-FFF2-40B4-BE49-F238E27FC236}">
-                <a16:creationId xmlns:a16="http://schemas.microsoft.com/office/drawing/2014/main" id="{11B7B386-6AB6-43AA-AD55-F2D183907889}"/>
+                <a16:creationId xmlns:a16="http://schemas.microsoft.com/office/drawing/2014/main" id="{ECA7A994-C089-42CD-8B95-C23459559029}"/>
               </a:ext>
             </a:extLst>
           </p:cNvPr>
@@ -4223,7 +4256,7 @@
           <a:p>
             <a:r>
               <a:rPr lang="en-GB" dirty="0"/>
-              <a:t>Why we are not doing Open Science already</a:t>
+              <a:t>Motivation</a:t>
             </a:r>
           </a:p>
         </p:txBody>
@@ -4233,7 +4266,7 @@
           <p:cNvPr id="3" name="Content Placeholder 2">
             <a:extLst>
               <a:ext uri="{FF2B5EF4-FFF2-40B4-BE49-F238E27FC236}">
-                <a16:creationId xmlns:a16="http://schemas.microsoft.com/office/drawing/2014/main" id="{3D2C3108-0F0E-4BF6-95E5-2F68D67F17CF}"/>
+                <a16:creationId xmlns:a16="http://schemas.microsoft.com/office/drawing/2014/main" id="{042518E7-2BC9-4C7D-A75B-C2FBC33E1E6B}"/>
               </a:ext>
             </a:extLst>
           </p:cNvPr>
@@ -4254,15 +4287,53 @@
             </a:pPr>
             <a:r>
               <a:rPr lang="en-GB" dirty="0"/>
+              <a:t>“stick”</a:t>
+            </a:r>
+          </a:p>
+          <a:p>
+            <a:r>
+              <a:rPr lang="en-GB" dirty="0"/>
+              <a:t>Large UK funding bodies such as The </a:t>
+            </a:r>
+            <a:r>
+              <a:rPr lang="en-GB" dirty="0" err="1"/>
+              <a:t>Wellcome</a:t>
+            </a:r>
+            <a:r>
+              <a:rPr lang="en-GB" dirty="0"/>
+              <a:t> Trust are big supporters of Open Science</a:t>
+            </a:r>
+          </a:p>
+          <a:p>
+            <a:endParaRPr lang="en-GB" dirty="0"/>
+          </a:p>
+          <a:p>
+            <a:pPr marL="0" indent="0">
+              <a:buNone/>
+            </a:pPr>
+            <a:r>
+              <a:rPr lang="en-GB" dirty="0"/>
+              <a:t>“carrot”</a:t>
+            </a:r>
+          </a:p>
+          <a:p>
+            <a:pPr marL="0" indent="0">
+              <a:buNone/>
+            </a:pPr>
+            <a:r>
+              <a:rPr lang="en-GB" dirty="0"/>
               <a:t>….</a:t>
             </a:r>
+          </a:p>
+          <a:p>
+            <a:endParaRPr lang="en-GB" dirty="0"/>
           </a:p>
         </p:txBody>
       </p:sp>
     </p:spTree>
     <p:extLst>
       <p:ext uri="{BB962C8B-B14F-4D97-AF65-F5344CB8AC3E}">
-        <p14:creationId xmlns:p14="http://schemas.microsoft.com/office/powerpoint/2010/main" val="3495940200"/>
+        <p14:creationId xmlns:p14="http://schemas.microsoft.com/office/powerpoint/2010/main" val="2787703030"/>
       </p:ext>
     </p:extLst>
   </p:cSld>
@@ -4338,47 +4409,20 @@
           <a:bodyPr/>
           <a:lstStyle/>
           <a:p>
-            <a:r>
-              <a:rPr lang="en-GB" dirty="0"/>
-              <a:t>sensitive data</a:t>
-            </a:r>
-          </a:p>
-          <a:p>
-            <a:r>
-              <a:rPr lang="en-GB" dirty="0"/>
-              <a:t>misuse (fake news)</a:t>
-            </a:r>
-          </a:p>
-          <a:p>
-            <a:r>
-              <a:rPr lang="en-GB" dirty="0"/>
-              <a:t>lack of confidence (the fear of critics)</a:t>
-            </a:r>
-          </a:p>
-          <a:p>
-            <a:r>
-              <a:rPr lang="en-GB" b="1" dirty="0"/>
-              <a:t>the costs in $ and in time</a:t>
-            </a:r>
-          </a:p>
-          <a:p>
-            <a:r>
-              <a:rPr lang="en-GB" dirty="0"/>
-              <a:t>IP</a:t>
-            </a:r>
-          </a:p>
-          <a:p>
-            <a:endParaRPr lang="en-GB" dirty="0"/>
-          </a:p>
-          <a:p>
-            <a:endParaRPr lang="en-GB" dirty="0"/>
+            <a:pPr marL="0" indent="0">
+              <a:buNone/>
+            </a:pPr>
+            <a:r>
+              <a:rPr lang="en-GB" dirty="0"/>
+              <a:t>….</a:t>
+            </a:r>
           </a:p>
         </p:txBody>
       </p:sp>
     </p:spTree>
     <p:extLst>
       <p:ext uri="{BB962C8B-B14F-4D97-AF65-F5344CB8AC3E}">
-        <p14:creationId xmlns:p14="http://schemas.microsoft.com/office/powerpoint/2010/main" val="561549881"/>
+        <p14:creationId xmlns:p14="http://schemas.microsoft.com/office/powerpoint/2010/main" val="3495940200"/>
       </p:ext>
     </p:extLst>
   </p:cSld>
@@ -4410,7 +4454,7 @@
           <p:cNvPr id="2" name="Title 1">
             <a:extLst>
               <a:ext uri="{FF2B5EF4-FFF2-40B4-BE49-F238E27FC236}">
-                <a16:creationId xmlns:a16="http://schemas.microsoft.com/office/drawing/2014/main" id="{400EA9EF-F85E-48CD-B474-FC5215D4E6B4}"/>
+                <a16:creationId xmlns:a16="http://schemas.microsoft.com/office/drawing/2014/main" id="{11B7B386-6AB6-43AA-AD55-F2D183907889}"/>
               </a:ext>
             </a:extLst>
           </p:cNvPr>
@@ -4428,7 +4472,7 @@
           <a:p>
             <a:r>
               <a:rPr lang="en-GB" dirty="0"/>
-              <a:t>Open Science and intellectual property</a:t>
+              <a:t>Why we are not doing Open Science already</a:t>
             </a:r>
           </a:p>
         </p:txBody>
@@ -4438,7 +4482,7 @@
           <p:cNvPr id="3" name="Content Placeholder 2">
             <a:extLst>
               <a:ext uri="{FF2B5EF4-FFF2-40B4-BE49-F238E27FC236}">
-                <a16:creationId xmlns:a16="http://schemas.microsoft.com/office/drawing/2014/main" id="{765C4BB6-3BCD-4376-B0CF-EDB58962C6C7}"/>
+                <a16:creationId xmlns:a16="http://schemas.microsoft.com/office/drawing/2014/main" id="{3D2C3108-0F0E-4BF6-95E5-2F68D67F17CF}"/>
               </a:ext>
             </a:extLst>
           </p:cNvPr>
@@ -4454,20 +4498,37 @@
           <a:bodyPr/>
           <a:lstStyle/>
           <a:p>
-            <a:pPr marL="0" indent="0">
-              <a:buNone/>
-            </a:pPr>
-            <a:r>
-              <a:rPr lang="en-GB" dirty="0"/>
-              <a:t>Intellectual property is something that you create using your mind - for example, a story, an invention, an artistic work or a symbol</a:t>
-            </a:r>
-            <a:endParaRPr lang="pl-PL" dirty="0"/>
-          </a:p>
-          <a:p>
-            <a:pPr marL="0" indent="0">
-              <a:buNone/>
-            </a:pPr>
-            <a:endParaRPr lang="pl-PL" dirty="0"/>
+            <a:r>
+              <a:rPr lang="en-GB" dirty="0"/>
+              <a:t>sensitive data</a:t>
+            </a:r>
+          </a:p>
+          <a:p>
+            <a:r>
+              <a:rPr lang="en-GB" dirty="0"/>
+              <a:t>misuse (fake news)</a:t>
+            </a:r>
+          </a:p>
+          <a:p>
+            <a:r>
+              <a:rPr lang="en-GB" dirty="0"/>
+              <a:t>lack of confidence (the fear of critics)</a:t>
+            </a:r>
+          </a:p>
+          <a:p>
+            <a:r>
+              <a:rPr lang="en-GB" b="1" dirty="0"/>
+              <a:t>the costs in $ and in time</a:t>
+            </a:r>
+          </a:p>
+          <a:p>
+            <a:r>
+              <a:rPr lang="en-GB" dirty="0"/>
+              <a:t>IP</a:t>
+            </a:r>
+          </a:p>
+          <a:p>
+            <a:endParaRPr lang="en-GB" dirty="0"/>
           </a:p>
           <a:p>
             <a:endParaRPr lang="en-GB" dirty="0"/>
@@ -4477,7 +4538,7 @@
     </p:spTree>
     <p:extLst>
       <p:ext uri="{BB962C8B-B14F-4D97-AF65-F5344CB8AC3E}">
-        <p14:creationId xmlns:p14="http://schemas.microsoft.com/office/powerpoint/2010/main" val="1742998959"/>
+        <p14:creationId xmlns:p14="http://schemas.microsoft.com/office/powerpoint/2010/main" val="561549881"/>
       </p:ext>
     </p:extLst>
   </p:cSld>
@@ -4557,44 +4618,16 @@
               <a:buNone/>
             </a:pPr>
             <a:r>
-              <a:rPr lang="pl-PL" dirty="0"/>
-              <a:t>Timeline matters for legal protection:</a:t>
-            </a:r>
-            <a:endParaRPr lang="en-GB" dirty="0"/>
-          </a:p>
-          <a:p>
+              <a:rPr lang="en-GB" dirty="0"/>
+              <a:t>Intellectual property is something that you create using your mind - for example, a story, an invention, an artistic work or a symbol</a:t>
+            </a:r>
             <a:endParaRPr lang="pl-PL" dirty="0"/>
           </a:p>
           <a:p>
-            <a:r>
-              <a:rPr lang="en-GB" dirty="0"/>
-              <a:t>Patents are granted only for inventions that are </a:t>
-            </a:r>
-            <a:r>
-              <a:rPr lang="en-GB" b="1" dirty="0"/>
-              <a:t>novel and were not known to the public</a:t>
-            </a:r>
-            <a:r>
-              <a:rPr lang="en-GB" dirty="0"/>
-              <a:t> in any form. </a:t>
-            </a:r>
-          </a:p>
-          <a:p>
-            <a:endParaRPr lang="en-GB" dirty="0"/>
-          </a:p>
-          <a:p>
-            <a:r>
-              <a:rPr lang="en-GB" dirty="0"/>
-              <a:t>Publishing in a journal or presenting in a conference with information related to the invention completely </a:t>
-            </a:r>
-            <a:r>
-              <a:rPr lang="en-GB" b="1" dirty="0"/>
-              <a:t>prevents the inventor from getting a patent later</a:t>
-            </a:r>
-            <a:r>
-              <a:rPr lang="en-GB" dirty="0"/>
-              <a:t>!</a:t>
-            </a:r>
+            <a:pPr marL="0" indent="0">
+              <a:buNone/>
+            </a:pPr>
+            <a:endParaRPr lang="pl-PL" dirty="0"/>
           </a:p>
           <a:p>
             <a:endParaRPr lang="en-GB" dirty="0"/>
@@ -4604,7 +4637,7 @@
     </p:spTree>
     <p:extLst>
       <p:ext uri="{BB962C8B-B14F-4D97-AF65-F5344CB8AC3E}">
-        <p14:creationId xmlns:p14="http://schemas.microsoft.com/office/powerpoint/2010/main" val="609744312"/>
+        <p14:creationId xmlns:p14="http://schemas.microsoft.com/office/powerpoint/2010/main" val="1742998959"/>
       </p:ext>
     </p:extLst>
   </p:cSld>
@@ -4680,12 +4713,47 @@
           <a:bodyPr/>
           <a:lstStyle/>
           <a:p>
+            <a:pPr marL="0" indent="0">
+              <a:buNone/>
+            </a:pPr>
+            <a:r>
+              <a:rPr lang="pl-PL" dirty="0"/>
+              <a:t>Timeline matters for legal protection:</a:t>
+            </a:r>
             <a:endParaRPr lang="en-GB" dirty="0"/>
           </a:p>
           <a:p>
-            <a:r>
-              <a:rPr lang="en-GB" dirty="0"/>
-              <a:t>(opinion) you are more likely to benefit from new collaborations, industrial partnerships, consultations which are acquired by openness, than from patent related royalties</a:t>
+            <a:endParaRPr lang="pl-PL" dirty="0"/>
+          </a:p>
+          <a:p>
+            <a:r>
+              <a:rPr lang="en-GB" dirty="0"/>
+              <a:t>Patents are granted only for inventions that are </a:t>
+            </a:r>
+            <a:r>
+              <a:rPr lang="en-GB" b="1" dirty="0"/>
+              <a:t>novel and were not known to the public</a:t>
+            </a:r>
+            <a:r>
+              <a:rPr lang="en-GB" dirty="0"/>
+              <a:t> in any form. </a:t>
+            </a:r>
+          </a:p>
+          <a:p>
+            <a:endParaRPr lang="en-GB" dirty="0"/>
+          </a:p>
+          <a:p>
+            <a:r>
+              <a:rPr lang="en-GB" dirty="0"/>
+              <a:t>Publishing in a journal or presenting in a conference with information related to the invention completely </a:t>
+            </a:r>
+            <a:r>
+              <a:rPr lang="en-GB" b="1" dirty="0"/>
+              <a:t>prevents the inventor from getting a patent later</a:t>
+            </a:r>
+            <a:r>
+              <a:rPr lang="en-GB" dirty="0"/>
+              <a:t>!</a:t>
             </a:r>
           </a:p>
           <a:p>
@@ -4696,7 +4764,7 @@
     </p:spTree>
     <p:extLst>
       <p:ext uri="{BB962C8B-B14F-4D97-AF65-F5344CB8AC3E}">
-        <p14:creationId xmlns:p14="http://schemas.microsoft.com/office/powerpoint/2010/main" val="603199283"/>
+        <p14:creationId xmlns:p14="http://schemas.microsoft.com/office/powerpoint/2010/main" val="609744312"/>
       </p:ext>
     </p:extLst>
   </p:cSld>
@@ -4728,7 +4796,7 @@
           <p:cNvPr id="2" name="Title 1">
             <a:extLst>
               <a:ext uri="{FF2B5EF4-FFF2-40B4-BE49-F238E27FC236}">
-                <a16:creationId xmlns:a16="http://schemas.microsoft.com/office/drawing/2014/main" id="{EE13BEF6-9EA9-444C-B76B-68F950916C0E}"/>
+                <a16:creationId xmlns:a16="http://schemas.microsoft.com/office/drawing/2014/main" id="{400EA9EF-F85E-48CD-B474-FC5215D4E6B4}"/>
               </a:ext>
             </a:extLst>
           </p:cNvPr>
@@ -4745,74 +4813,39 @@
           <a:lstStyle/>
           <a:p>
             <a:r>
-              <a:rPr lang="pl-PL" dirty="0"/>
-              <a:t>(Optional) </a:t>
-            </a:r>
-            <a:r>
-              <a:rPr lang="en-GB" dirty="0"/>
-              <a:t>Intellectual property</a:t>
-            </a:r>
-            <a:r>
-              <a:rPr lang="pl-PL" dirty="0"/>
-              <a:t> protection</a:t>
-            </a:r>
+              <a:rPr lang="en-GB" dirty="0"/>
+              <a:t>Open Science and intellectual property</a:t>
+            </a:r>
+          </a:p>
+        </p:txBody>
+      </p:sp>
+      <p:sp>
+        <p:nvSpPr>
+          <p:cNvPr id="3" name="Content Placeholder 2">
+            <a:extLst>
+              <a:ext uri="{FF2B5EF4-FFF2-40B4-BE49-F238E27FC236}">
+                <a16:creationId xmlns:a16="http://schemas.microsoft.com/office/drawing/2014/main" id="{765C4BB6-3BCD-4376-B0CF-EDB58962C6C7}"/>
+              </a:ext>
+            </a:extLst>
+          </p:cNvPr>
+          <p:cNvSpPr>
+            <a:spLocks noGrp="1"/>
+          </p:cNvSpPr>
+          <p:nvPr>
+            <p:ph idx="1"/>
+          </p:nvPr>
+        </p:nvSpPr>
+        <p:spPr/>
+        <p:txBody>
+          <a:bodyPr/>
+          <a:lstStyle/>
+          <a:p>
             <a:endParaRPr lang="en-GB" dirty="0"/>
           </a:p>
-        </p:txBody>
-      </p:sp>
-      <p:sp>
-        <p:nvSpPr>
-          <p:cNvPr id="3" name="Content Placeholder 2">
-            <a:extLst>
-              <a:ext uri="{FF2B5EF4-FFF2-40B4-BE49-F238E27FC236}">
-                <a16:creationId xmlns:a16="http://schemas.microsoft.com/office/drawing/2014/main" id="{62ADBD34-E840-44BA-A351-DD2796B9CD3A}"/>
-              </a:ext>
-            </a:extLst>
-          </p:cNvPr>
-          <p:cNvSpPr>
-            <a:spLocks noGrp="1"/>
-          </p:cNvSpPr>
-          <p:nvPr>
-            <p:ph idx="1"/>
-          </p:nvPr>
-        </p:nvSpPr>
-        <p:spPr/>
-        <p:txBody>
-          <a:bodyPr>
-            <a:normAutofit/>
-          </a:bodyPr>
-          <a:lstStyle/>
-          <a:p>
-            <a:endParaRPr lang="en-GB" dirty="0"/>
-          </a:p>
-          <a:p>
-            <a:r>
-              <a:rPr lang="en-GB" dirty="0"/>
-              <a:t>You can use a patent to protect your (</a:t>
-            </a:r>
-            <a:r>
-              <a:rPr lang="en-GB" i="1" dirty="0"/>
-              <a:t>technical</a:t>
-            </a:r>
-            <a:r>
-              <a:rPr lang="en-GB" dirty="0"/>
-              <a:t>) invention. </a:t>
-            </a:r>
-            <a:br>
-              <a:rPr lang="en-GB" dirty="0"/>
-            </a:br>
-            <a:r>
-              <a:rPr lang="en-GB" dirty="0"/>
-              <a:t>You can control copying, making, using, selling or importing</a:t>
-            </a:r>
-          </a:p>
-          <a:p>
-            <a:endParaRPr lang="en-GB" dirty="0"/>
-          </a:p>
-          <a:p>
-            <a:r>
-              <a:rPr lang="en-GB" dirty="0"/>
-              <a:t>Discoveries, mathematical methods, computer programs are not regarded as inventions. Therapeutic procedures, diagnostic methods and new plant or animal varieties are completely excluded from patentability.</a:t>
+          <a:p>
+            <a:r>
+              <a:rPr lang="en-GB" dirty="0"/>
+              <a:t>(opinion) you are more likely to benefit from new collaborations, industrial partnerships, consultations which are acquired by openness, than from patent related royalties</a:t>
             </a:r>
           </a:p>
           <a:p>
@@ -4823,7 +4856,7 @@
     </p:spTree>
     <p:extLst>
       <p:ext uri="{BB962C8B-B14F-4D97-AF65-F5344CB8AC3E}">
-        <p14:creationId xmlns:p14="http://schemas.microsoft.com/office/powerpoint/2010/main" val="1277938431"/>
+        <p14:creationId xmlns:p14="http://schemas.microsoft.com/office/powerpoint/2010/main" val="603199283"/>
       </p:ext>
     </p:extLst>
   </p:cSld>
@@ -4909,138 +4942,51 @@
             <a:pPr marL="0" indent="0">
               <a:buNone/>
             </a:pPr>
-            <a:r>
-              <a:rPr lang="en-GB" dirty="0"/>
-              <a:t>Open science is the movement to make scientific research </a:t>
-            </a:r>
-            <a:br>
-              <a:rPr lang="pl-PL" dirty="0"/>
-            </a:br>
-            <a:r>
-              <a:rPr lang="en-GB" b="1" dirty="0"/>
-              <a:t>accessible to all levels </a:t>
-            </a:r>
-            <a:r>
-              <a:rPr lang="en-GB" dirty="0"/>
-              <a:t>of </a:t>
-            </a:r>
-            <a:r>
-              <a:rPr lang="pl-PL" dirty="0"/>
-              <a:t>the </a:t>
-            </a:r>
-            <a:r>
-              <a:rPr lang="en-GB" dirty="0"/>
-              <a:t>society</a:t>
-            </a:r>
+            <a:endParaRPr lang="en-GB" dirty="0"/>
           </a:p>
           <a:p>
             <a:pPr marL="0" indent="0">
               <a:buNone/>
             </a:pPr>
-            <a:endParaRPr lang="en-GB" dirty="0"/>
-          </a:p>
-        </p:txBody>
-      </p:sp>
-      <p:sp>
-        <p:nvSpPr>
-          <p:cNvPr id="4" name="TextBox 3"/>
-          <p:cNvSpPr txBox="1"/>
-          <p:nvPr/>
-        </p:nvSpPr>
-        <p:spPr>
-          <a:xfrm>
-            <a:off x="1339140" y="3468915"/>
-            <a:ext cx="1856277" cy="1200329"/>
-          </a:xfrm>
-          <a:prstGeom prst="rect">
-            <a:avLst/>
-          </a:prstGeom>
-          <a:noFill/>
-        </p:spPr>
-        <p:txBody>
-          <a:bodyPr wrap="none" rtlCol="0">
-            <a:spAutoFit/>
-          </a:bodyPr>
-          <a:lstStyle/>
-          <a:p>
-            <a:r>
-              <a:rPr lang="en-GB" dirty="0"/>
-              <a:t>publications </a:t>
-            </a:r>
             <a:endParaRPr lang="pl-PL" dirty="0"/>
           </a:p>
           <a:p>
-            <a:r>
-              <a:rPr lang="en-GB" dirty="0"/>
-              <a:t>data </a:t>
+            <a:pPr marL="0" indent="0" algn="ctr">
+              <a:buNone/>
+            </a:pPr>
+            <a:r>
+              <a:rPr lang="en-GB" dirty="0"/>
+              <a:t>Open science is transparent and accessible knowledge </a:t>
             </a:r>
             <a:endParaRPr lang="pl-PL" dirty="0"/>
           </a:p>
           <a:p>
-            <a:r>
-              <a:rPr lang="en-GB" dirty="0"/>
-              <a:t>physical samples </a:t>
-            </a:r>
-            <a:endParaRPr lang="pl-PL" dirty="0"/>
-          </a:p>
-          <a:p>
-            <a:r>
-              <a:rPr lang="en-GB" dirty="0"/>
-              <a:t>software</a:t>
-            </a:r>
-          </a:p>
-        </p:txBody>
-      </p:sp>
-      <p:sp>
-        <p:nvSpPr>
-          <p:cNvPr id="5" name="TextBox 4"/>
-          <p:cNvSpPr txBox="1"/>
-          <p:nvPr/>
-        </p:nvSpPr>
-        <p:spPr>
-          <a:xfrm>
-            <a:off x="7690210" y="3191916"/>
-            <a:ext cx="1544077" cy="1477328"/>
-          </a:xfrm>
-          <a:prstGeom prst="rect">
-            <a:avLst/>
-          </a:prstGeom>
-          <a:noFill/>
-        </p:spPr>
-        <p:txBody>
-          <a:bodyPr wrap="none" rtlCol="0">
-            <a:spAutoFit/>
-          </a:bodyPr>
-          <a:lstStyle/>
-          <a:p>
-            <a:r>
-              <a:rPr lang="pl-PL" dirty="0"/>
-              <a:t>general public</a:t>
-            </a:r>
-          </a:p>
-          <a:p>
-            <a:r>
-              <a:rPr lang="pl-PL" dirty="0"/>
-              <a:t>amateurs</a:t>
-            </a:r>
-          </a:p>
-          <a:p>
-            <a:r>
-              <a:rPr lang="pl-PL" dirty="0"/>
-              <a:t>professionals</a:t>
-            </a:r>
-          </a:p>
-          <a:p>
-            <a:r>
-              <a:rPr lang="pl-PL" dirty="0"/>
-              <a:t>students</a:t>
-            </a:r>
-          </a:p>
-          <a:p>
-            <a:r>
-              <a:rPr lang="pl-PL" dirty="0"/>
-              <a:t>teachers</a:t>
-            </a:r>
+            <a:pPr marL="0" indent="0" algn="ctr">
+              <a:buNone/>
+            </a:pPr>
+            <a:r>
+              <a:rPr lang="en-GB" dirty="0"/>
+              <a:t>that is shared and developed </a:t>
+            </a:r>
+            <a:endParaRPr lang="pl-PL" dirty="0" smtClean="0"/>
+          </a:p>
+          <a:p>
+            <a:pPr marL="0" indent="0" algn="ctr">
+              <a:buNone/>
+            </a:pPr>
+            <a:r>
+              <a:rPr lang="en-GB" dirty="0" smtClean="0"/>
+              <a:t>through </a:t>
+            </a:r>
+            <a:r>
+              <a:rPr lang="en-GB" dirty="0"/>
+              <a:t>collaborative networks.</a:t>
+            </a:r>
+          </a:p>
+          <a:p>
+            <a:pPr marL="0" indent="0">
+              <a:buNone/>
+            </a:pPr>
             <a:endParaRPr lang="en-GB" dirty="0"/>
           </a:p>
         </p:txBody>
@@ -5048,7 +4994,7 @@
     </p:spTree>
     <p:extLst>
       <p:ext uri="{BB962C8B-B14F-4D97-AF65-F5344CB8AC3E}">
-        <p14:creationId xmlns:p14="http://schemas.microsoft.com/office/powerpoint/2010/main" val="120735669"/>
+        <p14:creationId xmlns:p14="http://schemas.microsoft.com/office/powerpoint/2010/main" val="2551197208"/>
       </p:ext>
     </p:extLst>
   </p:cSld>
@@ -5135,40 +5081,39 @@
           </a:bodyPr>
           <a:lstStyle/>
           <a:p>
-            <a:r>
-              <a:rPr lang="en-GB" dirty="0"/>
-              <a:t>Patents are granted only for inventions that are </a:t>
-            </a:r>
-            <a:r>
-              <a:rPr lang="en-GB" b="1" dirty="0"/>
-              <a:t>novel and were not known to the public</a:t>
-            </a:r>
-            <a:r>
-              <a:rPr lang="en-GB" dirty="0"/>
-              <a:t> in any form. </a:t>
-            </a:r>
-          </a:p>
-          <a:p>
             <a:endParaRPr lang="en-GB" dirty="0"/>
           </a:p>
           <a:p>
             <a:r>
               <a:rPr lang="en-GB" dirty="0"/>
-              <a:t>Publishing in a journal or presenting in a conference with information related to the invention completely </a:t>
-            </a:r>
-            <a:r>
-              <a:rPr lang="en-GB" b="1" dirty="0"/>
-              <a:t>prevents the inventor from getting a patent later</a:t>
-            </a:r>
-            <a:r>
-              <a:rPr lang="en-GB" dirty="0"/>
-              <a:t>!</a:t>
-            </a:r>
-          </a:p>
-          <a:p>
-            <a:pPr marL="0" indent="0">
-              <a:buNone/>
-            </a:pPr>
+              <a:t>You can use a patent to protect your (</a:t>
+            </a:r>
+            <a:r>
+              <a:rPr lang="en-GB" i="1" dirty="0"/>
+              <a:t>technical</a:t>
+            </a:r>
+            <a:r>
+              <a:rPr lang="en-GB" dirty="0"/>
+              <a:t>) invention. </a:t>
+            </a:r>
+            <a:br>
+              <a:rPr lang="en-GB" dirty="0"/>
+            </a:br>
+            <a:r>
+              <a:rPr lang="en-GB" dirty="0"/>
+              <a:t>You can control copying, making, using, selling or importing</a:t>
+            </a:r>
+          </a:p>
+          <a:p>
+            <a:endParaRPr lang="en-GB" dirty="0"/>
+          </a:p>
+          <a:p>
+            <a:r>
+              <a:rPr lang="en-GB" dirty="0"/>
+              <a:t>Discoveries, mathematical methods, computer programs are not regarded as inventions. Therapeutic procedures, diagnostic methods and new plant or animal varieties are completely excluded from patentability.</a:t>
+            </a:r>
+          </a:p>
+          <a:p>
             <a:endParaRPr lang="en-GB" dirty="0"/>
           </a:p>
         </p:txBody>
@@ -5176,7 +5121,7 @@
     </p:spTree>
     <p:extLst>
       <p:ext uri="{BB962C8B-B14F-4D97-AF65-F5344CB8AC3E}">
-        <p14:creationId xmlns:p14="http://schemas.microsoft.com/office/powerpoint/2010/main" val="1952765325"/>
+        <p14:creationId xmlns:p14="http://schemas.microsoft.com/office/powerpoint/2010/main" val="1277938431"/>
       </p:ext>
     </p:extLst>
   </p:cSld>
@@ -5259,97 +5204,44 @@
         <p:spPr/>
         <p:txBody>
           <a:bodyPr>
-            <a:normAutofit fontScale="92500" lnSpcReduction="10000"/>
+            <a:normAutofit/>
           </a:bodyPr>
           <a:lstStyle/>
           <a:p>
+            <a:r>
+              <a:rPr lang="en-GB" dirty="0"/>
+              <a:t>Patents are granted only for inventions that are </a:t>
+            </a:r>
+            <a:r>
+              <a:rPr lang="en-GB" b="1" dirty="0"/>
+              <a:t>novel and were not known to the public</a:t>
+            </a:r>
+            <a:r>
+              <a:rPr lang="en-GB" dirty="0"/>
+              <a:t> in any form. </a:t>
+            </a:r>
+          </a:p>
+          <a:p>
+            <a:endParaRPr lang="en-GB" dirty="0"/>
+          </a:p>
+          <a:p>
+            <a:r>
+              <a:rPr lang="en-GB" dirty="0"/>
+              <a:t>Publishing in a journal or presenting in a conference with information related to the invention completely </a:t>
+            </a:r>
+            <a:r>
+              <a:rPr lang="en-GB" b="1" dirty="0"/>
+              <a:t>prevents the inventor from getting a patent later</a:t>
+            </a:r>
+            <a:r>
+              <a:rPr lang="en-GB" dirty="0"/>
+              <a:t>!</a:t>
+            </a:r>
+          </a:p>
+          <a:p>
             <a:pPr marL="0" indent="0">
               <a:buNone/>
             </a:pPr>
-            <a:r>
-              <a:rPr lang="en-GB" dirty="0"/>
-              <a:t>In </a:t>
-            </a:r>
-            <a:r>
-              <a:rPr lang="pl-PL" dirty="0"/>
-              <a:t>principle</a:t>
-            </a:r>
-            <a:r>
-              <a:rPr lang="en-GB" dirty="0"/>
-              <a:t>, software cannot be patented</a:t>
-            </a:r>
-            <a:r>
-              <a:rPr lang="pl-PL" dirty="0"/>
-              <a:t> </a:t>
-            </a:r>
-          </a:p>
-          <a:p>
-            <a:pPr marL="0" indent="0">
-              <a:buNone/>
-            </a:pPr>
-            <a:r>
-              <a:rPr lang="pl-PL" dirty="0"/>
-              <a:t>(„no but yes” case by case, decided by court)</a:t>
-            </a:r>
-            <a:endParaRPr lang="en-GB" dirty="0"/>
-          </a:p>
-          <a:p>
-            <a:pPr marL="0" indent="0">
-              <a:buNone/>
-            </a:pPr>
-            <a:endParaRPr lang="en-GB" b="1" dirty="0"/>
-          </a:p>
-          <a:p>
-            <a:pPr marL="0" indent="0">
-              <a:buNone/>
-            </a:pPr>
-            <a:r>
-              <a:rPr lang="en-GB" b="1" dirty="0"/>
-              <a:t>Software code is copyrighted</a:t>
-            </a:r>
-            <a:r>
-              <a:rPr lang="en-GB" dirty="0"/>
-              <a:t>. Copyright prevents people from:</a:t>
-            </a:r>
-          </a:p>
-          <a:p>
-            <a:r>
-              <a:rPr lang="en-GB" dirty="0"/>
-              <a:t>copying your </a:t>
-            </a:r>
-            <a:r>
-              <a:rPr lang="pl-PL" dirty="0"/>
-              <a:t>code</a:t>
-            </a:r>
-            <a:endParaRPr lang="en-GB" dirty="0"/>
-          </a:p>
-          <a:p>
-            <a:r>
-              <a:rPr lang="en-GB" dirty="0"/>
-              <a:t>distributing copies of it, whether free of charge or for sale.</a:t>
-            </a:r>
-          </a:p>
-          <a:p>
-            <a:pPr marL="0" indent="0">
-              <a:buNone/>
-            </a:pPr>
-            <a:endParaRPr lang="en-GB" dirty="0"/>
-          </a:p>
-          <a:p>
-            <a:endParaRPr lang="en-GB" dirty="0"/>
-          </a:p>
-          <a:p>
-            <a:pPr marL="0" indent="0">
-              <a:buNone/>
-            </a:pPr>
-            <a:r>
-              <a:rPr lang="en-GB" dirty="0"/>
-              <a:t>Data cannot be patented and in general, it cannot be copyrighted. </a:t>
-            </a:r>
-            <a:r>
-              <a:rPr lang="en-GB" b="1" dirty="0"/>
-              <a:t>It is not possible to copyright facts!</a:t>
-            </a:r>
             <a:endParaRPr lang="en-GB" dirty="0"/>
           </a:p>
         </p:txBody>
@@ -5357,7 +5249,7 @@
     </p:spTree>
     <p:extLst>
       <p:ext uri="{BB962C8B-B14F-4D97-AF65-F5344CB8AC3E}">
-        <p14:creationId xmlns:p14="http://schemas.microsoft.com/office/powerpoint/2010/main" val="468162496"/>
+        <p14:creationId xmlns:p14="http://schemas.microsoft.com/office/powerpoint/2010/main" val="1952765325"/>
       </p:ext>
     </p:extLst>
   </p:cSld>
@@ -5389,7 +5281,7 @@
           <p:cNvPr id="2" name="Title 1">
             <a:extLst>
               <a:ext uri="{FF2B5EF4-FFF2-40B4-BE49-F238E27FC236}">
-                <a16:creationId xmlns:a16="http://schemas.microsoft.com/office/drawing/2014/main" id="{3A5186E0-B0CC-4664-8D5D-FE79BD5CB56F}"/>
+                <a16:creationId xmlns:a16="http://schemas.microsoft.com/office/drawing/2014/main" id="{EE13BEF6-9EA9-444C-B76B-68F950916C0E}"/>
               </a:ext>
             </a:extLst>
           </p:cNvPr>
@@ -5406,12 +5298,16 @@
           <a:lstStyle/>
           <a:p>
             <a:r>
-              <a:rPr lang="en-GB" dirty="0"/>
-              <a:t>Open Science </a:t>
-            </a:r>
-            <a:r>
               <a:rPr lang="pl-PL" dirty="0"/>
-              <a:t>get involved</a:t>
+              <a:t>(Optional) </a:t>
+            </a:r>
+            <a:r>
+              <a:rPr lang="en-GB" dirty="0"/>
+              <a:t>Intellectual property</a:t>
+            </a:r>
+            <a:r>
+              <a:rPr lang="pl-PL" dirty="0"/>
+              <a:t> protection</a:t>
             </a:r>
             <a:endParaRPr lang="en-GB" dirty="0"/>
           </a:p>
@@ -5422,7 +5318,7 @@
           <p:cNvPr id="3" name="Content Placeholder 2">
             <a:extLst>
               <a:ext uri="{FF2B5EF4-FFF2-40B4-BE49-F238E27FC236}">
-                <a16:creationId xmlns:a16="http://schemas.microsoft.com/office/drawing/2014/main" id="{B18006D0-1239-4806-A27B-A8672C87B4E3}"/>
+                <a16:creationId xmlns:a16="http://schemas.microsoft.com/office/drawing/2014/main" id="{62ADBD34-E840-44BA-A351-DD2796B9CD3A}"/>
               </a:ext>
             </a:extLst>
           </p:cNvPr>
@@ -5435,7 +5331,9 @@
         </p:nvSpPr>
         <p:spPr/>
         <p:txBody>
-          <a:bodyPr/>
+          <a:bodyPr>
+            <a:normAutofit fontScale="92500" lnSpcReduction="10000"/>
+          </a:bodyPr>
           <a:lstStyle/>
           <a:p>
             <a:pPr marL="0" indent="0">
@@ -5443,43 +5341,96 @@
             </a:pPr>
             <a:r>
               <a:rPr lang="en-GB" dirty="0"/>
-              <a:t>incentive structures are beginning to support Open Science practices:</a:t>
-            </a:r>
-          </a:p>
-          <a:p>
-            <a:pPr>
-              <a:buFontTx/>
-              <a:buChar char="-"/>
+              <a:t>In </a:t>
+            </a:r>
+            <a:r>
+              <a:rPr lang="pl-PL" dirty="0"/>
+              <a:t>principle</a:t>
+            </a:r>
+            <a:r>
+              <a:rPr lang="en-GB" dirty="0"/>
+              <a:t>, software cannot be patented</a:t>
+            </a:r>
+            <a:r>
+              <a:rPr lang="pl-PL" dirty="0"/>
+              <a:t> </a:t>
+            </a:r>
+          </a:p>
+          <a:p>
+            <a:pPr marL="0" indent="0">
+              <a:buNone/>
             </a:pPr>
             <a:r>
-              <a:rPr lang="en-GB" dirty="0"/>
-              <a:t>Universities signing up to the Declaration on Research Assessment (DORA)</a:t>
-            </a:r>
-          </a:p>
-          <a:p>
-            <a:pPr>
-              <a:buFontTx/>
-              <a:buChar char="-"/>
+              <a:rPr lang="pl-PL" dirty="0"/>
+              <a:t>(„no but yes” case by case, decided by court)</a:t>
+            </a:r>
+            <a:endParaRPr lang="en-GB" dirty="0"/>
+          </a:p>
+          <a:p>
+            <a:pPr marL="0" indent="0">
+              <a:buNone/>
             </a:pPr>
-            <a:r>
-              <a:rPr lang="en-GB" dirty="0"/>
-              <a:t>the </a:t>
-            </a:r>
-            <a:r>
-              <a:rPr lang="en-GB" dirty="0" err="1"/>
-              <a:t>Wellcome</a:t>
-            </a:r>
-            <a:r>
-              <a:rPr lang="en-GB" dirty="0"/>
-              <a:t> Trust funding proposals that increase Open Science or evidence of OS activities for new grant applications</a:t>
-            </a:r>
+            <a:endParaRPr lang="en-GB" b="1" dirty="0"/>
+          </a:p>
+          <a:p>
+            <a:pPr marL="0" indent="0">
+              <a:buNone/>
+            </a:pPr>
+            <a:r>
+              <a:rPr lang="en-GB" b="1" dirty="0"/>
+              <a:t>Software code is copyrighted</a:t>
+            </a:r>
+            <a:r>
+              <a:rPr lang="en-GB" dirty="0"/>
+              <a:t>. Copyright prevents people from:</a:t>
+            </a:r>
+          </a:p>
+          <a:p>
+            <a:r>
+              <a:rPr lang="en-GB" dirty="0"/>
+              <a:t>copying your </a:t>
+            </a:r>
+            <a:r>
+              <a:rPr lang="pl-PL" dirty="0"/>
+              <a:t>code</a:t>
+            </a:r>
+            <a:endParaRPr lang="en-GB" dirty="0"/>
+          </a:p>
+          <a:p>
+            <a:r>
+              <a:rPr lang="en-GB" dirty="0"/>
+              <a:t>distributing copies of it, whether free of charge or for sale.</a:t>
+            </a:r>
+          </a:p>
+          <a:p>
+            <a:pPr marL="0" indent="0">
+              <a:buNone/>
+            </a:pPr>
+            <a:endParaRPr lang="en-GB" dirty="0"/>
+          </a:p>
+          <a:p>
+            <a:endParaRPr lang="en-GB" dirty="0"/>
+          </a:p>
+          <a:p>
+            <a:pPr marL="0" indent="0">
+              <a:buNone/>
+            </a:pPr>
+            <a:r>
+              <a:rPr lang="en-GB" dirty="0"/>
+              <a:t>Data cannot be patented and in general, it cannot be copyrighted. </a:t>
+            </a:r>
+            <a:r>
+              <a:rPr lang="en-GB" b="1" dirty="0"/>
+              <a:t>It is not possible to copyright facts!</a:t>
+            </a:r>
+            <a:endParaRPr lang="en-GB" dirty="0"/>
           </a:p>
         </p:txBody>
       </p:sp>
     </p:spTree>
     <p:extLst>
       <p:ext uri="{BB962C8B-B14F-4D97-AF65-F5344CB8AC3E}">
-        <p14:creationId xmlns:p14="http://schemas.microsoft.com/office/powerpoint/2010/main" val="2522472367"/>
+        <p14:creationId xmlns:p14="http://schemas.microsoft.com/office/powerpoint/2010/main" val="468162496"/>
       </p:ext>
     </p:extLst>
   </p:cSld>
@@ -5528,6 +5479,128 @@
           <a:lstStyle/>
           <a:p>
             <a:r>
+              <a:rPr lang="en-GB" dirty="0"/>
+              <a:t>Open Science </a:t>
+            </a:r>
+            <a:r>
+              <a:rPr lang="pl-PL" dirty="0"/>
+              <a:t>get involved</a:t>
+            </a:r>
+            <a:endParaRPr lang="en-GB" dirty="0"/>
+          </a:p>
+        </p:txBody>
+      </p:sp>
+      <p:sp>
+        <p:nvSpPr>
+          <p:cNvPr id="3" name="Content Placeholder 2">
+            <a:extLst>
+              <a:ext uri="{FF2B5EF4-FFF2-40B4-BE49-F238E27FC236}">
+                <a16:creationId xmlns:a16="http://schemas.microsoft.com/office/drawing/2014/main" id="{B18006D0-1239-4806-A27B-A8672C87B4E3}"/>
+              </a:ext>
+            </a:extLst>
+          </p:cNvPr>
+          <p:cNvSpPr>
+            <a:spLocks noGrp="1"/>
+          </p:cNvSpPr>
+          <p:nvPr>
+            <p:ph idx="1"/>
+          </p:nvPr>
+        </p:nvSpPr>
+        <p:spPr/>
+        <p:txBody>
+          <a:bodyPr/>
+          <a:lstStyle/>
+          <a:p>
+            <a:pPr marL="0" indent="0">
+              <a:buNone/>
+            </a:pPr>
+            <a:r>
+              <a:rPr lang="en-GB" dirty="0"/>
+              <a:t>incentive structures are beginning to support Open Science practices:</a:t>
+            </a:r>
+          </a:p>
+          <a:p>
+            <a:pPr>
+              <a:buFontTx/>
+              <a:buChar char="-"/>
+            </a:pPr>
+            <a:r>
+              <a:rPr lang="en-GB" dirty="0"/>
+              <a:t>Universities signing up to the Declaration on Research Assessment (DORA)</a:t>
+            </a:r>
+          </a:p>
+          <a:p>
+            <a:pPr>
+              <a:buFontTx/>
+              <a:buChar char="-"/>
+            </a:pPr>
+            <a:r>
+              <a:rPr lang="en-GB" dirty="0"/>
+              <a:t>the </a:t>
+            </a:r>
+            <a:r>
+              <a:rPr lang="en-GB" dirty="0" err="1"/>
+              <a:t>Wellcome</a:t>
+            </a:r>
+            <a:r>
+              <a:rPr lang="en-GB" dirty="0"/>
+              <a:t> Trust funding proposals that increase Open Science or evidence of OS activities for new grant applications</a:t>
+            </a:r>
+          </a:p>
+        </p:txBody>
+      </p:sp>
+    </p:spTree>
+    <p:extLst>
+      <p:ext uri="{BB962C8B-B14F-4D97-AF65-F5344CB8AC3E}">
+        <p14:creationId xmlns:p14="http://schemas.microsoft.com/office/powerpoint/2010/main" val="2522472367"/>
+      </p:ext>
+    </p:extLst>
+  </p:cSld>
+  <p:clrMapOvr>
+    <a:masterClrMapping/>
+  </p:clrMapOvr>
+</p:sld>
+</file>
+
+<file path=ppt/slides/slide24.xml><?xml version="1.0" encoding="utf-8"?>
+<p:sld xmlns:a="http://schemas.openxmlformats.org/drawingml/2006/main" xmlns:r="http://schemas.openxmlformats.org/officeDocument/2006/relationships" xmlns:p="http://schemas.openxmlformats.org/presentationml/2006/main">
+  <p:cSld>
+    <p:spTree>
+      <p:nvGrpSpPr>
+        <p:cNvPr id="1" name=""/>
+        <p:cNvGrpSpPr/>
+        <p:nvPr/>
+      </p:nvGrpSpPr>
+      <p:grpSpPr>
+        <a:xfrm>
+          <a:off x="0" y="0"/>
+          <a:ext cx="0" cy="0"/>
+          <a:chOff x="0" y="0"/>
+          <a:chExt cx="0" cy="0"/>
+        </a:xfrm>
+      </p:grpSpPr>
+      <p:sp>
+        <p:nvSpPr>
+          <p:cNvPr id="2" name="Title 1">
+            <a:extLst>
+              <a:ext uri="{FF2B5EF4-FFF2-40B4-BE49-F238E27FC236}">
+                <a16:creationId xmlns:a16="http://schemas.microsoft.com/office/drawing/2014/main" id="{3A5186E0-B0CC-4664-8D5D-FE79BD5CB56F}"/>
+              </a:ext>
+            </a:extLst>
+          </p:cNvPr>
+          <p:cNvSpPr>
+            <a:spLocks noGrp="1"/>
+          </p:cNvSpPr>
+          <p:nvPr>
+            <p:ph type="title"/>
+          </p:nvPr>
+        </p:nvSpPr>
+        <p:spPr/>
+        <p:txBody>
+          <a:bodyPr/>
+          <a:lstStyle/>
+          <a:p>
+            <a:r>
               <a:rPr lang="pl-PL" dirty="0"/>
               <a:t>Where to next</a:t>
             </a:r>
@@ -5576,7 +5649,7 @@
 </p:sld>
 </file>
 
-<file path=ppt/slides/slide24.xml><?xml version="1.0" encoding="utf-8"?>
+<file path=ppt/slides/slide25.xml><?xml version="1.0" encoding="utf-8"?>
 <p:sld xmlns:a="http://schemas.openxmlformats.org/drawingml/2006/main" xmlns:r="http://schemas.openxmlformats.org/officeDocument/2006/relationships" xmlns:p="http://schemas.openxmlformats.org/presentationml/2006/main">
   <p:cSld>
     <p:spTree>
@@ -5681,13 +5754,7 @@
       </p:grpSpPr>
       <p:sp>
         <p:nvSpPr>
-          <p:cNvPr id="2" name="Title 1">
-            <a:extLst>
-              <a:ext uri="{FF2B5EF4-FFF2-40B4-BE49-F238E27FC236}">
-                <a16:creationId xmlns:a16="http://schemas.microsoft.com/office/drawing/2014/main" id="{917BA876-9561-462B-89F2-FFD0BB8C58F1}"/>
-              </a:ext>
-            </a:extLst>
-          </p:cNvPr>
+          <p:cNvPr id="2" name="Title 1"/>
           <p:cNvSpPr>
             <a:spLocks noGrp="1"/>
           </p:cNvSpPr>
@@ -5700,22 +5767,13 @@
           <a:bodyPr/>
           <a:lstStyle/>
           <a:p>
-            <a:r>
-              <a:rPr lang="en-GB" dirty="0"/>
-              <a:t>Open Science</a:t>
-            </a:r>
-          </a:p>
-        </p:txBody>
-      </p:sp>
-      <p:sp>
-        <p:nvSpPr>
-          <p:cNvPr id="3" name="Content Placeholder 2">
-            <a:extLst>
-              <a:ext uri="{FF2B5EF4-FFF2-40B4-BE49-F238E27FC236}">
-                <a16:creationId xmlns:a16="http://schemas.microsoft.com/office/drawing/2014/main" id="{32BDDAC9-35A8-4328-B5EA-8844C448EBC3}"/>
-              </a:ext>
-            </a:extLst>
-          </p:cNvPr>
+            <a:endParaRPr lang="en-GB"/>
+          </a:p>
+        </p:txBody>
+      </p:sp>
+      <p:sp>
+        <p:nvSpPr>
+          <p:cNvPr id="3" name="Content Placeholder 2"/>
           <p:cNvSpPr>
             <a:spLocks noGrp="1"/>
           </p:cNvSpPr>
@@ -5723,81 +5781,150 @@
             <p:ph idx="1"/>
           </p:nvPr>
         </p:nvSpPr>
+        <p:spPr/>
+        <p:txBody>
+          <a:bodyPr/>
+          <a:lstStyle/>
+          <a:p>
+            <a:endParaRPr lang="en-GB"/>
+          </a:p>
+        </p:txBody>
+      </p:sp>
+      <p:pic>
+        <p:nvPicPr>
+          <p:cNvPr id="4" name="Picture 3">
+            <a:extLst>
+              <a:ext uri="{FF2B5EF4-FFF2-40B4-BE49-F238E27FC236}">
+                <a16:creationId xmlns:a16="http://schemas.microsoft.com/office/drawing/2014/main" id="{43824753-16F4-EA4C-A410-95B7DF1D0C80}"/>
+              </a:ext>
+            </a:extLst>
+          </p:cNvPr>
+          <p:cNvPicPr>
+            <a:picLocks noChangeAspect="1"/>
+          </p:cNvPicPr>
+          <p:nvPr/>
+        </p:nvPicPr>
+        <p:blipFill>
+          <a:blip r:embed="rId2"/>
+          <a:srcRect/>
+          <a:stretch/>
+        </p:blipFill>
         <p:spPr>
           <a:xfrm>
-            <a:off x="838200" y="1605280"/>
-            <a:ext cx="10515600" cy="4927600"/>
+            <a:off x="0" y="0"/>
+            <a:ext cx="12192000" cy="6858000"/>
           </a:xfrm>
+          <a:prstGeom prst="rect">
+            <a:avLst/>
+          </a:prstGeom>
         </p:spPr>
-        <p:txBody>
-          <a:bodyPr>
+      </p:pic>
+      <p:sp>
+        <p:nvSpPr>
+          <p:cNvPr id="5" name="Title 1">
+            <a:extLst>
+              <a:ext uri="{FF2B5EF4-FFF2-40B4-BE49-F238E27FC236}">
+                <a16:creationId xmlns:a16="http://schemas.microsoft.com/office/drawing/2014/main" id="{0074CBAA-282A-D345-B648-FF32D4429FA9}"/>
+              </a:ext>
+            </a:extLst>
+          </p:cNvPr>
+          <p:cNvSpPr txBox="1">
+            <a:spLocks/>
+          </p:cNvSpPr>
+          <p:nvPr/>
+        </p:nvSpPr>
+        <p:spPr>
+          <a:xfrm>
+            <a:off x="838200" y="0"/>
+            <a:ext cx="10515600" cy="1325563"/>
+          </a:xfrm>
+          <a:prstGeom prst="rect">
+            <a:avLst/>
+          </a:prstGeom>
+        </p:spPr>
+        <p:txBody>
+          <a:bodyPr vert="horz" lIns="91440" tIns="45720" rIns="91440" bIns="45720" rtlCol="0" anchor="ctr">
             <a:normAutofit/>
           </a:bodyPr>
-          <a:lstStyle/>
-          <a:p>
-            <a:pPr marL="0" indent="0">
-              <a:buNone/>
-            </a:pPr>
-            <a:r>
-              <a:rPr lang="pl-PL" dirty="0"/>
-              <a:t>N</a:t>
-            </a:r>
-            <a:r>
-              <a:rPr lang="en-GB" dirty="0" err="1"/>
-              <a:t>ew</a:t>
-            </a:r>
-            <a:r>
-              <a:rPr lang="en-GB" dirty="0"/>
-              <a:t> approach to the scientific process based on</a:t>
-            </a:r>
-            <a:r>
-              <a:rPr lang="pl-PL" dirty="0"/>
-              <a:t>:</a:t>
-            </a:r>
-          </a:p>
-          <a:p>
-            <a:pPr>
-              <a:buFontTx/>
-              <a:buChar char="-"/>
-            </a:pPr>
-            <a:r>
-              <a:rPr lang="en-GB" b="1" dirty="0"/>
-              <a:t>digital technologies</a:t>
-            </a:r>
-            <a:r>
-              <a:rPr lang="en-GB" dirty="0"/>
-              <a:t> </a:t>
-            </a:r>
-            <a:r>
-              <a:rPr lang="pl-PL" dirty="0"/>
-              <a:t>for</a:t>
-            </a:r>
-            <a:r>
-              <a:rPr lang="en-GB" b="1" dirty="0"/>
-              <a:t> </a:t>
-            </a:r>
-            <a:r>
-              <a:rPr lang="en-GB" dirty="0"/>
-              <a:t>diffusing knowledge</a:t>
-            </a:r>
-            <a:endParaRPr lang="pl-PL" dirty="0"/>
-          </a:p>
-          <a:p>
-            <a:pPr>
-              <a:buFontTx/>
-              <a:buChar char="-"/>
-            </a:pPr>
-            <a:r>
-              <a:rPr lang="en-GB" b="1" dirty="0"/>
-              <a:t>cooperative work </a:t>
-            </a:r>
-            <a:r>
-              <a:rPr lang="pl-PL" dirty="0"/>
-              <a:t>and </a:t>
-            </a:r>
-            <a:r>
-              <a:rPr lang="en-GB" dirty="0"/>
-              <a:t>collaborative tools</a:t>
+          <a:lstStyle>
+            <a:lvl1pPr algn="l" defTabSz="914400" rtl="0" eaLnBrk="1" latinLnBrk="0" hangingPunct="1">
+              <a:lnSpc>
+                <a:spcPct val="90000"/>
+              </a:lnSpc>
+              <a:spcBef>
+                <a:spcPct val="0"/>
+              </a:spcBef>
+              <a:buNone/>
+              <a:defRPr sz="4400" kern="1200">
+                <a:solidFill>
+                  <a:schemeClr val="tx1"/>
+                </a:solidFill>
+                <a:latin typeface="+mj-lt"/>
+                <a:ea typeface="+mj-ea"/>
+                <a:cs typeface="+mj-cs"/>
+              </a:defRPr>
+            </a:lvl1pPr>
+          </a:lstStyle>
+          <a:p>
+            <a:r>
+              <a:rPr lang="en-US" smtClean="0"/>
+              <a:t>Evolution of Open Science</a:t>
+            </a:r>
+            <a:endParaRPr lang="en-US" dirty="0"/>
+          </a:p>
+        </p:txBody>
+      </p:sp>
+      <p:sp>
+        <p:nvSpPr>
+          <p:cNvPr id="6" name="Right Triangle 5">
+            <a:extLst>
+              <a:ext uri="{FF2B5EF4-FFF2-40B4-BE49-F238E27FC236}">
+                <a16:creationId xmlns:a16="http://schemas.microsoft.com/office/drawing/2014/main" id="{640076C4-D2E3-D14B-9381-59C5F3C3134C}"/>
+              </a:ext>
+            </a:extLst>
+          </p:cNvPr>
+          <p:cNvSpPr/>
+          <p:nvPr/>
+        </p:nvSpPr>
+        <p:spPr>
+          <a:xfrm flipH="1">
+            <a:off x="0" y="5872163"/>
+            <a:ext cx="12192000" cy="985837"/>
+          </a:xfrm>
+          <a:prstGeom prst="rtTriangle">
+            <a:avLst/>
+          </a:prstGeom>
+          <a:solidFill>
+            <a:srgbClr val="EA035E"/>
+          </a:solidFill>
+          <a:ln>
+            <a:noFill/>
+          </a:ln>
+        </p:spPr>
+        <p:style>
+          <a:lnRef idx="2">
+            <a:schemeClr val="dk1">
+              <a:shade val="50000"/>
+            </a:schemeClr>
+          </a:lnRef>
+          <a:fillRef idx="1">
+            <a:schemeClr val="dk1"/>
+          </a:fillRef>
+          <a:effectRef idx="0">
+            <a:schemeClr val="dk1"/>
+          </a:effectRef>
+          <a:fontRef idx="minor">
+            <a:schemeClr val="lt1"/>
+          </a:fontRef>
+        </p:style>
+        <p:txBody>
+          <a:bodyPr lIns="0" rtlCol="0" anchor="ctr"/>
+          <a:lstStyle/>
+          <a:p>
+            <a:pPr algn="r"/>
+            <a:r>
+              <a:rPr lang="en-US" sz="2800" dirty="0"/>
+              <a:t>Level of openness in research</a:t>
             </a:r>
           </a:p>
         </p:txBody>
@@ -5805,13 +5932,20 @@
     </p:spTree>
     <p:extLst>
       <p:ext uri="{BB962C8B-B14F-4D97-AF65-F5344CB8AC3E}">
-        <p14:creationId xmlns:p14="http://schemas.microsoft.com/office/powerpoint/2010/main" val="2640623075"/>
+        <p14:creationId xmlns:p14="http://schemas.microsoft.com/office/powerpoint/2010/main" val="671288680"/>
       </p:ext>
     </p:extLst>
   </p:cSld>
   <p:clrMapOvr>
     <a:masterClrMapping/>
   </p:clrMapOvr>
+  <p:timing>
+    <p:tnLst>
+      <p:par>
+        <p:cTn id="1" dur="indefinite" restart="never" nodeType="tmRoot"/>
+      </p:par>
+    </p:tnLst>
+  </p:timing>
 </p:sld>
 </file>
 
@@ -5891,37 +6025,178 @@
             <a:pPr marL="0" indent="0">
               <a:buNone/>
             </a:pPr>
+            <a:r>
+              <a:rPr lang="en-GB" dirty="0"/>
+              <a:t>Open science is the movement to make scientific research </a:t>
+            </a:r>
+            <a:r>
+              <a:rPr lang="pl-PL" dirty="0"/>
+              <a:t/>
+            </a:r>
+            <a:br>
+              <a:rPr lang="pl-PL" dirty="0"/>
+            </a:br>
+            <a:r>
+              <a:rPr lang="en-GB" b="1" dirty="0"/>
+              <a:t>accessible to all levels </a:t>
+            </a:r>
+            <a:r>
+              <a:rPr lang="en-GB" dirty="0"/>
+              <a:t>of </a:t>
+            </a:r>
+            <a:r>
+              <a:rPr lang="pl-PL" dirty="0"/>
+              <a:t>the </a:t>
+            </a:r>
+            <a:r>
+              <a:rPr lang="en-GB" dirty="0"/>
+              <a:t>society</a:t>
+            </a:r>
+          </a:p>
+          <a:p>
+            <a:pPr marL="0" indent="0">
+              <a:buNone/>
+            </a:pPr>
             <a:endParaRPr lang="en-GB" dirty="0"/>
           </a:p>
-          <a:p>
-            <a:pPr marL="0" indent="0">
-              <a:buNone/>
+        </p:txBody>
+      </p:sp>
+      <p:sp>
+        <p:nvSpPr>
+          <p:cNvPr id="4" name="TextBox 3"/>
+          <p:cNvSpPr txBox="1"/>
+          <p:nvPr/>
+        </p:nvSpPr>
+        <p:spPr>
+          <a:xfrm>
+            <a:off x="1339140" y="3468915"/>
+            <a:ext cx="2087110" cy="1200329"/>
+          </a:xfrm>
+          <a:prstGeom prst="rect">
+            <a:avLst/>
+          </a:prstGeom>
+          <a:noFill/>
+        </p:spPr>
+        <p:txBody>
+          <a:bodyPr wrap="none" rtlCol="0">
+            <a:spAutoFit/>
+          </a:bodyPr>
+          <a:lstStyle/>
+          <a:p>
+            <a:pPr marL="285750" indent="-285750">
+              <a:buFont typeface="Arial" panose="020B0604020202020204" pitchFamily="34" charset="0"/>
+              <a:buChar char="•"/>
             </a:pPr>
+            <a:r>
+              <a:rPr lang="en-GB" dirty="0"/>
+              <a:t>publications </a:t>
+            </a:r>
             <a:endParaRPr lang="pl-PL" dirty="0"/>
           </a:p>
           <a:p>
-            <a:pPr marL="0" indent="0">
-              <a:buNone/>
+            <a:pPr marL="285750" indent="-285750">
+              <a:buFont typeface="Arial" panose="020B0604020202020204" pitchFamily="34" charset="0"/>
+              <a:buChar char="•"/>
             </a:pPr>
             <a:r>
               <a:rPr lang="en-GB" dirty="0"/>
-              <a:t>Open science is transparent and accessible knowledge </a:t>
+              <a:t>data </a:t>
             </a:r>
             <a:endParaRPr lang="pl-PL" dirty="0"/>
           </a:p>
           <a:p>
-            <a:pPr marL="0" indent="0">
-              <a:buNone/>
+            <a:pPr marL="285750" indent="-285750">
+              <a:buFont typeface="Arial" panose="020B0604020202020204" pitchFamily="34" charset="0"/>
+              <a:buChar char="•"/>
             </a:pPr>
             <a:r>
               <a:rPr lang="en-GB" dirty="0"/>
-              <a:t>that is shared and developed through collaborative networks.</a:t>
-            </a:r>
-          </a:p>
-          <a:p>
-            <a:pPr marL="0" indent="0">
-              <a:buNone/>
+              <a:t>physical samples </a:t>
+            </a:r>
+            <a:endParaRPr lang="pl-PL" dirty="0"/>
+          </a:p>
+          <a:p>
+            <a:pPr marL="285750" indent="-285750">
+              <a:buFont typeface="Arial" panose="020B0604020202020204" pitchFamily="34" charset="0"/>
+              <a:buChar char="•"/>
             </a:pPr>
+            <a:r>
+              <a:rPr lang="en-GB" dirty="0"/>
+              <a:t>software</a:t>
+            </a:r>
+          </a:p>
+        </p:txBody>
+      </p:sp>
+      <p:sp>
+        <p:nvSpPr>
+          <p:cNvPr id="5" name="TextBox 4"/>
+          <p:cNvSpPr txBox="1"/>
+          <p:nvPr/>
+        </p:nvSpPr>
+        <p:spPr>
+          <a:xfrm>
+            <a:off x="7690210" y="3191916"/>
+            <a:ext cx="1793824" cy="1477328"/>
+          </a:xfrm>
+          <a:prstGeom prst="rect">
+            <a:avLst/>
+          </a:prstGeom>
+          <a:noFill/>
+        </p:spPr>
+        <p:txBody>
+          <a:bodyPr wrap="none" rtlCol="0">
+            <a:spAutoFit/>
+          </a:bodyPr>
+          <a:lstStyle/>
+          <a:p>
+            <a:pPr marL="285750" indent="-285750">
+              <a:buFont typeface="Arial" panose="020B0604020202020204" pitchFamily="34" charset="0"/>
+              <a:buChar char="•"/>
+            </a:pPr>
+            <a:r>
+              <a:rPr lang="pl-PL" dirty="0"/>
+              <a:t>general public</a:t>
+            </a:r>
+          </a:p>
+          <a:p>
+            <a:pPr marL="285750" indent="-285750">
+              <a:buFont typeface="Arial" panose="020B0604020202020204" pitchFamily="34" charset="0"/>
+              <a:buChar char="•"/>
+            </a:pPr>
+            <a:r>
+              <a:rPr lang="pl-PL" dirty="0"/>
+              <a:t>amateurs</a:t>
+            </a:r>
+          </a:p>
+          <a:p>
+            <a:pPr marL="285750" indent="-285750">
+              <a:buFont typeface="Arial" panose="020B0604020202020204" pitchFamily="34" charset="0"/>
+              <a:buChar char="•"/>
+            </a:pPr>
+            <a:r>
+              <a:rPr lang="pl-PL" dirty="0"/>
+              <a:t>professionals</a:t>
+            </a:r>
+          </a:p>
+          <a:p>
+            <a:pPr marL="285750" indent="-285750">
+              <a:buFont typeface="Arial" panose="020B0604020202020204" pitchFamily="34" charset="0"/>
+              <a:buChar char="•"/>
+            </a:pPr>
+            <a:r>
+              <a:rPr lang="pl-PL" dirty="0"/>
+              <a:t>students</a:t>
+            </a:r>
+          </a:p>
+          <a:p>
+            <a:pPr marL="285750" indent="-285750">
+              <a:buFont typeface="Arial" panose="020B0604020202020204" pitchFamily="34" charset="0"/>
+              <a:buChar char="•"/>
+            </a:pPr>
+            <a:r>
+              <a:rPr lang="pl-PL" dirty="0"/>
+              <a:t>teachers</a:t>
+            </a:r>
             <a:endParaRPr lang="en-GB" dirty="0"/>
           </a:p>
         </p:txBody>
@@ -5929,13 +6204,20 @@
     </p:spTree>
     <p:extLst>
       <p:ext uri="{BB962C8B-B14F-4D97-AF65-F5344CB8AC3E}">
-        <p14:creationId xmlns:p14="http://schemas.microsoft.com/office/powerpoint/2010/main" val="2551197208"/>
+        <p14:creationId xmlns:p14="http://schemas.microsoft.com/office/powerpoint/2010/main" val="120735669"/>
       </p:ext>
     </p:extLst>
   </p:cSld>
   <p:clrMapOvr>
     <a:masterClrMapping/>
   </p:clrMapOvr>
+  <p:timing>
+    <p:tnLst>
+      <p:par>
+        <p:cTn id="1" dur="indefinite" restart="never" nodeType="tmRoot"/>
+      </p:par>
+    </p:tnLst>
+  </p:timing>
 </p:sld>
 </file>
 
@@ -5981,120 +6263,100 @@
               <a:rPr lang="en-GB" dirty="0"/>
               <a:t>Open Science</a:t>
             </a:r>
+          </a:p>
+        </p:txBody>
+      </p:sp>
+      <p:sp>
+        <p:nvSpPr>
+          <p:cNvPr id="3" name="Content Placeholder 2">
+            <a:extLst>
+              <a:ext uri="{FF2B5EF4-FFF2-40B4-BE49-F238E27FC236}">
+                <a16:creationId xmlns:a16="http://schemas.microsoft.com/office/drawing/2014/main" id="{32BDDAC9-35A8-4328-B5EA-8844C448EBC3}"/>
+              </a:ext>
+            </a:extLst>
+          </p:cNvPr>
+          <p:cNvSpPr>
+            <a:spLocks noGrp="1"/>
+          </p:cNvSpPr>
+          <p:nvPr>
+            <p:ph idx="1"/>
+          </p:nvPr>
+        </p:nvSpPr>
+        <p:spPr>
+          <a:xfrm>
+            <a:off x="838200" y="1605280"/>
+            <a:ext cx="10515600" cy="4927600"/>
+          </a:xfrm>
+        </p:spPr>
+        <p:txBody>
+          <a:bodyPr>
+            <a:normAutofit/>
+          </a:bodyPr>
+          <a:lstStyle/>
+          <a:p>
+            <a:pPr marL="0" indent="0">
+              <a:buNone/>
+            </a:pPr>
             <a:r>
               <a:rPr lang="pl-PL" dirty="0"/>
-              <a:t> - Charactersitics</a:t>
-            </a:r>
-            <a:endParaRPr lang="en-GB" dirty="0"/>
-          </a:p>
-        </p:txBody>
-      </p:sp>
-      <p:sp>
-        <p:nvSpPr>
-          <p:cNvPr id="3" name="Content Placeholder 2">
-            <a:extLst>
-              <a:ext uri="{FF2B5EF4-FFF2-40B4-BE49-F238E27FC236}">
-                <a16:creationId xmlns:a16="http://schemas.microsoft.com/office/drawing/2014/main" id="{32BDDAC9-35A8-4328-B5EA-8844C448EBC3}"/>
-              </a:ext>
-            </a:extLst>
-          </p:cNvPr>
-          <p:cNvSpPr>
-            <a:spLocks noGrp="1"/>
-          </p:cNvSpPr>
-          <p:nvPr>
-            <p:ph idx="1"/>
-          </p:nvPr>
-        </p:nvSpPr>
-        <p:spPr/>
-        <p:txBody>
-          <a:bodyPr/>
-          <a:lstStyle/>
-          <a:p>
-            <a:pPr marL="285750" indent="-285750">
-              <a:buFont typeface="Arial" charset="0"/>
-              <a:buChar char="•"/>
+              <a:t>N</a:t>
+            </a:r>
+            <a:r>
+              <a:rPr lang="en-GB" dirty="0" err="1"/>
+              <a:t>ew</a:t>
+            </a:r>
+            <a:r>
+              <a:rPr lang="en-GB" dirty="0"/>
+              <a:t> approach to the scientific process based on</a:t>
+            </a:r>
+            <a:r>
+              <a:rPr lang="pl-PL" dirty="0"/>
+              <a:t>:</a:t>
+            </a:r>
+          </a:p>
+          <a:p>
+            <a:pPr>
+              <a:buFontTx/>
+              <a:buChar char="-"/>
             </a:pPr>
-            <a:endParaRPr lang="en-GB" b="1" dirty="0"/>
-          </a:p>
-          <a:p>
-            <a:pPr marL="285750" indent="-285750">
-              <a:buFont typeface="Arial" charset="0"/>
-              <a:buChar char="•"/>
-            </a:pPr>
-            <a:r>
-              <a:rPr lang="pl-PL" b="1" dirty="0"/>
-              <a:t>W</a:t>
-            </a:r>
-            <a:r>
-              <a:rPr lang="en-GB" b="1" dirty="0" err="1"/>
-              <a:t>eb</a:t>
-            </a:r>
             <a:r>
               <a:rPr lang="en-GB" b="1" dirty="0"/>
-              <a:t>-based tools</a:t>
-            </a:r>
-            <a:r>
-              <a:rPr lang="en-GB" dirty="0"/>
-              <a:t> to facilitate information exchange collaboration </a:t>
-            </a:r>
-          </a:p>
-          <a:p>
-            <a:pPr marL="285750" indent="-285750">
-              <a:buFont typeface="Arial" charset="0"/>
-              <a:buChar char="•"/>
-            </a:pPr>
-            <a:endParaRPr lang="en-GB" b="1" dirty="0"/>
-          </a:p>
-          <a:p>
-            <a:pPr marL="285750" indent="-285750">
-              <a:buFont typeface="Arial" charset="0"/>
-              <a:buChar char="•"/>
-            </a:pPr>
-            <a:r>
-              <a:rPr lang="en-GB" b="1" dirty="0"/>
-              <a:t>Transparency</a:t>
-            </a:r>
-            <a:r>
-              <a:rPr lang="en-GB" dirty="0"/>
-              <a:t> in experimental methodology, observation, and collection of data </a:t>
-            </a:r>
-            <a:endParaRPr lang="pl-PL" dirty="0"/>
-          </a:p>
-          <a:p>
-            <a:pPr marL="285750" indent="-285750">
-              <a:buFont typeface="Arial" charset="0"/>
-              <a:buChar char="•"/>
-            </a:pPr>
-            <a:endParaRPr lang="en-GB" dirty="0"/>
-          </a:p>
-          <a:p>
-            <a:pPr marL="285750" indent="-285750">
-              <a:buFont typeface="Arial" charset="0"/>
-              <a:buChar char="•"/>
-            </a:pPr>
-            <a:r>
-              <a:rPr lang="en-GB" b="1" dirty="0"/>
-              <a:t>Public availability</a:t>
-            </a:r>
-            <a:r>
-              <a:rPr lang="en-GB" dirty="0"/>
-              <a:t> and reusability of scientific data</a:t>
+              <a:t>digital technologies</a:t>
+            </a:r>
+            <a:r>
+              <a:rPr lang="en-GB" dirty="0"/>
+              <a:t> </a:t>
             </a:r>
             <a:r>
               <a:rPr lang="pl-PL" dirty="0"/>
-              <a:t>, methods and </a:t>
-            </a:r>
-            <a:r>
-              <a:rPr lang="en-GB" dirty="0"/>
-              <a:t>communication</a:t>
-            </a:r>
-            <a:r>
-              <a:rPr lang="pl-PL" dirty="0"/>
-              <a:t>s</a:t>
+              <a:t>for</a:t>
             </a:r>
             <a:r>
               <a:rPr lang="en-GB" b="1" dirty="0"/>
               <a:t> </a:t>
+            </a:r>
+            <a:r>
+              <a:rPr lang="en-GB" dirty="0"/>
+              <a:t>diffusing knowledge</a:t>
+            </a:r>
+            <a:endParaRPr lang="pl-PL" dirty="0"/>
+          </a:p>
+          <a:p>
+            <a:pPr>
+              <a:buFontTx/>
+              <a:buChar char="-"/>
+            </a:pPr>
+            <a:r>
+              <a:rPr lang="en-GB" b="1" dirty="0"/>
+              <a:t>cooperative work </a:t>
+            </a:r>
+            <a:r>
+              <a:rPr lang="pl-PL" dirty="0"/>
+              <a:t>and </a:t>
+            </a:r>
+            <a:r>
+              <a:rPr lang="en-GB" dirty="0"/>
+              <a:t>collaborative tools</a:t>
             </a:r>
           </a:p>
         </p:txBody>
@@ -6102,7 +6364,7 @@
     </p:spTree>
     <p:extLst>
       <p:ext uri="{BB962C8B-B14F-4D97-AF65-F5344CB8AC3E}">
-        <p14:creationId xmlns:p14="http://schemas.microsoft.com/office/powerpoint/2010/main" val="2567057435"/>
+        <p14:creationId xmlns:p14="http://schemas.microsoft.com/office/powerpoint/2010/main" val="2640623075"/>
       </p:ext>
     </p:extLst>
   </p:cSld>
@@ -6154,76 +6416,120 @@
               <a:rPr lang="en-GB" dirty="0"/>
               <a:t>Open Science</a:t>
             </a:r>
-          </a:p>
-        </p:txBody>
-      </p:sp>
-      <p:pic>
-        <p:nvPicPr>
-          <p:cNvPr id="7" name="Picture 6">
-            <a:extLst>
-              <a:ext uri="{FF2B5EF4-FFF2-40B4-BE49-F238E27FC236}">
-                <a16:creationId xmlns:a16="http://schemas.microsoft.com/office/drawing/2014/main" id="{4BE59DD7-8111-4360-8E11-D0D1857E0ED2}"/>
-              </a:ext>
-            </a:extLst>
-          </p:cNvPr>
-          <p:cNvPicPr>
-            <a:picLocks noChangeAspect="1"/>
-          </p:cNvPicPr>
-          <p:nvPr/>
-        </p:nvPicPr>
-        <p:blipFill>
-          <a:blip r:embed="rId2">
-            <a:extLst>
-              <a:ext uri="{28A0092B-C50C-407E-A947-70E740481C1C}">
-                <a14:useLocalDpi xmlns:a14="http://schemas.microsoft.com/office/drawing/2010/main" val="0"/>
-              </a:ext>
-            </a:extLst>
-          </a:blip>
-          <a:stretch>
-            <a:fillRect/>
-          </a:stretch>
-        </p:blipFill>
-        <p:spPr>
-          <a:xfrm>
-            <a:off x="1602557" y="1303976"/>
-            <a:ext cx="8986886" cy="5192730"/>
-          </a:xfrm>
-          <a:prstGeom prst="rect">
-            <a:avLst/>
-          </a:prstGeom>
-        </p:spPr>
-      </p:pic>
-      <p:sp>
-        <p:nvSpPr>
-          <p:cNvPr id="3" name="TextBox 2">
-            <a:extLst>
-              <a:ext uri="{FF2B5EF4-FFF2-40B4-BE49-F238E27FC236}">
-                <a16:creationId xmlns:a16="http://schemas.microsoft.com/office/drawing/2014/main" id="{FC993136-21F8-4C60-998C-3D9B641EB2F6}"/>
-              </a:ext>
-            </a:extLst>
-          </p:cNvPr>
-          <p:cNvSpPr txBox="1"/>
-          <p:nvPr/>
-        </p:nvSpPr>
-        <p:spPr>
-          <a:xfrm>
-            <a:off x="669303" y="6353666"/>
-            <a:ext cx="1485215" cy="307777"/>
-          </a:xfrm>
-          <a:prstGeom prst="rect">
-            <a:avLst/>
-          </a:prstGeom>
-          <a:noFill/>
-        </p:spPr>
-        <p:txBody>
-          <a:bodyPr wrap="none" rtlCol="0">
-            <a:spAutoFit/>
-          </a:bodyPr>
-          <a:lstStyle/>
-          <a:p>
-            <a:r>
-              <a:rPr lang="en-GB" sz="1400" dirty="0"/>
-              <a:t>CREDITS [1] CC BY</a:t>
+            <a:r>
+              <a:rPr lang="pl-PL" dirty="0"/>
+              <a:t> - Charactersitics</a:t>
+            </a:r>
+            <a:endParaRPr lang="en-GB" dirty="0"/>
+          </a:p>
+        </p:txBody>
+      </p:sp>
+      <p:sp>
+        <p:nvSpPr>
+          <p:cNvPr id="3" name="Content Placeholder 2">
+            <a:extLst>
+              <a:ext uri="{FF2B5EF4-FFF2-40B4-BE49-F238E27FC236}">
+                <a16:creationId xmlns:a16="http://schemas.microsoft.com/office/drawing/2014/main" id="{32BDDAC9-35A8-4328-B5EA-8844C448EBC3}"/>
+              </a:ext>
+            </a:extLst>
+          </p:cNvPr>
+          <p:cNvSpPr>
+            <a:spLocks noGrp="1"/>
+          </p:cNvSpPr>
+          <p:nvPr>
+            <p:ph idx="1"/>
+          </p:nvPr>
+        </p:nvSpPr>
+        <p:spPr/>
+        <p:txBody>
+          <a:bodyPr/>
+          <a:lstStyle/>
+          <a:p>
+            <a:pPr marL="285750" indent="-285750">
+              <a:buFont typeface="Arial" charset="0"/>
+              <a:buChar char="•"/>
+            </a:pPr>
+            <a:endParaRPr lang="en-GB" b="1" dirty="0"/>
+          </a:p>
+          <a:p>
+            <a:pPr marL="285750" indent="-285750">
+              <a:buFont typeface="Arial" charset="0"/>
+              <a:buChar char="•"/>
+            </a:pPr>
+            <a:r>
+              <a:rPr lang="pl-PL" b="1" dirty="0"/>
+              <a:t>W</a:t>
+            </a:r>
+            <a:r>
+              <a:rPr lang="en-GB" b="1" dirty="0" err="1"/>
+              <a:t>eb</a:t>
+            </a:r>
+            <a:r>
+              <a:rPr lang="en-GB" b="1" dirty="0"/>
+              <a:t>-based tools</a:t>
+            </a:r>
+            <a:r>
+              <a:rPr lang="en-GB" dirty="0"/>
+              <a:t> to facilitate information exchange collaboration </a:t>
+            </a:r>
+          </a:p>
+          <a:p>
+            <a:pPr marL="285750" indent="-285750">
+              <a:buFont typeface="Arial" charset="0"/>
+              <a:buChar char="•"/>
+            </a:pPr>
+            <a:endParaRPr lang="en-GB" b="1" dirty="0"/>
+          </a:p>
+          <a:p>
+            <a:pPr marL="285750" indent="-285750">
+              <a:buFont typeface="Arial" charset="0"/>
+              <a:buChar char="•"/>
+            </a:pPr>
+            <a:r>
+              <a:rPr lang="en-GB" b="1" dirty="0"/>
+              <a:t>Transparency</a:t>
+            </a:r>
+            <a:r>
+              <a:rPr lang="en-GB" dirty="0"/>
+              <a:t> in experimental methodology, observation, and collection of data </a:t>
+            </a:r>
+            <a:endParaRPr lang="pl-PL" dirty="0"/>
+          </a:p>
+          <a:p>
+            <a:pPr marL="285750" indent="-285750">
+              <a:buFont typeface="Arial" charset="0"/>
+              <a:buChar char="•"/>
+            </a:pPr>
+            <a:endParaRPr lang="en-GB" dirty="0"/>
+          </a:p>
+          <a:p>
+            <a:pPr marL="285750" indent="-285750">
+              <a:buFont typeface="Arial" charset="0"/>
+              <a:buChar char="•"/>
+            </a:pPr>
+            <a:r>
+              <a:rPr lang="en-GB" b="1" dirty="0"/>
+              <a:t>Public availability</a:t>
+            </a:r>
+            <a:r>
+              <a:rPr lang="en-GB" dirty="0"/>
+              <a:t> and reusability of scientific data</a:t>
+            </a:r>
+            <a:r>
+              <a:rPr lang="pl-PL" dirty="0"/>
+              <a:t>, methods and </a:t>
+            </a:r>
+            <a:r>
+              <a:rPr lang="en-GB" dirty="0"/>
+              <a:t>communication</a:t>
+            </a:r>
+            <a:r>
+              <a:rPr lang="pl-PL" dirty="0"/>
+              <a:t>s</a:t>
+            </a:r>
+            <a:r>
+              <a:rPr lang="en-GB" b="1" dirty="0"/>
+              <a:t> </a:t>
             </a:r>
           </a:p>
         </p:txBody>
@@ -6231,7 +6537,7 @@
     </p:spTree>
     <p:extLst>
       <p:ext uri="{BB962C8B-B14F-4D97-AF65-F5344CB8AC3E}">
-        <p14:creationId xmlns:p14="http://schemas.microsoft.com/office/powerpoint/2010/main" val="3700976644"/>
+        <p14:creationId xmlns:p14="http://schemas.microsoft.com/office/powerpoint/2010/main" val="2567057435"/>
       </p:ext>
     </p:extLst>
   </p:cSld>
@@ -6263,7 +6569,7 @@
           <p:cNvPr id="2" name="Title 1">
             <a:extLst>
               <a:ext uri="{FF2B5EF4-FFF2-40B4-BE49-F238E27FC236}">
-                <a16:creationId xmlns:a16="http://schemas.microsoft.com/office/drawing/2014/main" id="{BA9DA74F-73B3-421A-BD2A-363B267769ED}"/>
+                <a16:creationId xmlns:a16="http://schemas.microsoft.com/office/drawing/2014/main" id="{917BA876-9561-462B-89F2-FFD0BB8C58F1}"/>
               </a:ext>
             </a:extLst>
           </p:cNvPr>
@@ -6280,74 +6586,87 @@
           <a:lstStyle/>
           <a:p>
             <a:r>
-              <a:rPr lang="pl-PL" dirty="0"/>
-              <a:t>Outcomes</a:t>
-            </a:r>
-            <a:r>
-              <a:rPr lang="en-GB" dirty="0"/>
-              <a:t> of Openness</a:t>
-            </a:r>
-          </a:p>
-        </p:txBody>
-      </p:sp>
-      <p:sp>
-        <p:nvSpPr>
-          <p:cNvPr id="3" name="Content Placeholder 2">
-            <a:extLst>
-              <a:ext uri="{FF2B5EF4-FFF2-40B4-BE49-F238E27FC236}">
-                <a16:creationId xmlns:a16="http://schemas.microsoft.com/office/drawing/2014/main" id="{D7A3F2CD-AB38-44C7-977C-EDF39BD02DB3}"/>
-              </a:ext>
-            </a:extLst>
-          </p:cNvPr>
-          <p:cNvSpPr>
-            <a:spLocks noGrp="1"/>
-          </p:cNvSpPr>
-          <p:nvPr>
-            <p:ph idx="1"/>
-          </p:nvPr>
-        </p:nvSpPr>
-        <p:spPr/>
-        <p:txBody>
-          <a:bodyPr/>
-          <a:lstStyle/>
-          <a:p>
-            <a:pPr marL="0" indent="0">
-              <a:buNone/>
-            </a:pPr>
-            <a:endParaRPr lang="pl-PL" dirty="0"/>
-          </a:p>
-          <a:p>
-            <a:pPr marL="0" indent="0">
-              <a:buNone/>
-            </a:pPr>
-            <a:r>
-              <a:rPr lang="en-GB" dirty="0"/>
-              <a:t>Open educational resources:</a:t>
-            </a:r>
-          </a:p>
-          <a:p>
-            <a:r>
-              <a:rPr lang="en-GB" dirty="0"/>
-              <a:t>enables collaborative development of courses</a:t>
-            </a:r>
-          </a:p>
-          <a:p>
-            <a:r>
-              <a:rPr lang="en-GB" dirty="0"/>
-              <a:t>improves teachers/instructors skills by sharing</a:t>
-            </a:r>
-            <a:r>
-              <a:rPr lang="pl-PL" dirty="0"/>
-              <a:t> ideas</a:t>
-            </a:r>
-            <a:endParaRPr lang="en-GB" dirty="0"/>
+              <a:rPr lang="en-GB" dirty="0"/>
+              <a:t>Open Science</a:t>
+            </a:r>
+          </a:p>
+        </p:txBody>
+      </p:sp>
+      <p:pic>
+        <p:nvPicPr>
+          <p:cNvPr id="7" name="Picture 6">
+            <a:extLst>
+              <a:ext uri="{FF2B5EF4-FFF2-40B4-BE49-F238E27FC236}">
+                <a16:creationId xmlns:a16="http://schemas.microsoft.com/office/drawing/2014/main" id="{4BE59DD7-8111-4360-8E11-D0D1857E0ED2}"/>
+              </a:ext>
+            </a:extLst>
+          </p:cNvPr>
+          <p:cNvPicPr>
+            <a:picLocks noChangeAspect="1"/>
+          </p:cNvPicPr>
+          <p:nvPr/>
+        </p:nvPicPr>
+        <p:blipFill>
+          <a:blip r:embed="rId2">
+            <a:extLst>
+              <a:ext uri="{28A0092B-C50C-407E-A947-70E740481C1C}">
+                <a14:useLocalDpi xmlns:a14="http://schemas.microsoft.com/office/drawing/2010/main" val="0"/>
+              </a:ext>
+            </a:extLst>
+          </a:blip>
+          <a:stretch>
+            <a:fillRect/>
+          </a:stretch>
+        </p:blipFill>
+        <p:spPr>
+          <a:xfrm>
+            <a:off x="1602557" y="1303976"/>
+            <a:ext cx="8986886" cy="5192730"/>
+          </a:xfrm>
+          <a:prstGeom prst="rect">
+            <a:avLst/>
+          </a:prstGeom>
+        </p:spPr>
+      </p:pic>
+      <p:sp>
+        <p:nvSpPr>
+          <p:cNvPr id="3" name="TextBox 2">
+            <a:extLst>
+              <a:ext uri="{FF2B5EF4-FFF2-40B4-BE49-F238E27FC236}">
+                <a16:creationId xmlns:a16="http://schemas.microsoft.com/office/drawing/2014/main" id="{FC993136-21F8-4C60-998C-3D9B641EB2F6}"/>
+              </a:ext>
+            </a:extLst>
+          </p:cNvPr>
+          <p:cNvSpPr txBox="1"/>
+          <p:nvPr/>
+        </p:nvSpPr>
+        <p:spPr>
+          <a:xfrm>
+            <a:off x="669303" y="6353666"/>
+            <a:ext cx="1485215" cy="307777"/>
+          </a:xfrm>
+          <a:prstGeom prst="rect">
+            <a:avLst/>
+          </a:prstGeom>
+          <a:noFill/>
+        </p:spPr>
+        <p:txBody>
+          <a:bodyPr wrap="none" rtlCol="0">
+            <a:spAutoFit/>
+          </a:bodyPr>
+          <a:lstStyle/>
+          <a:p>
+            <a:r>
+              <a:rPr lang="en-GB" sz="1400" dirty="0"/>
+              <a:t>CREDITS [1] CC BY</a:t>
+            </a:r>
           </a:p>
         </p:txBody>
       </p:sp>
     </p:spTree>
     <p:extLst>
       <p:ext uri="{BB962C8B-B14F-4D97-AF65-F5344CB8AC3E}">
-        <p14:creationId xmlns:p14="http://schemas.microsoft.com/office/powerpoint/2010/main" val="3161521187"/>
+        <p14:creationId xmlns:p14="http://schemas.microsoft.com/office/powerpoint/2010/main" val="3700976644"/>
       </p:ext>
     </p:extLst>
   </p:cSld>
@@ -6430,12 +6749,32 @@
             <a:pPr marL="0" indent="0">
               <a:buNone/>
             </a:pPr>
-            <a:r>
-              <a:rPr lang="en-GB" dirty="0"/>
-              <a:t>Exercise</a:t>
-            </a:r>
-          </a:p>
-          <a:p>
+            <a:endParaRPr lang="pl-PL" dirty="0"/>
+          </a:p>
+          <a:p>
+            <a:pPr marL="0" indent="0">
+              <a:buNone/>
+            </a:pPr>
+            <a:r>
+              <a:rPr lang="en-GB" dirty="0"/>
+              <a:t>Open educational resources:</a:t>
+            </a:r>
+          </a:p>
+          <a:p>
+            <a:r>
+              <a:rPr lang="en-GB" dirty="0"/>
+              <a:t>enables collaborative development of courses</a:t>
+            </a:r>
+          </a:p>
+          <a:p>
+            <a:r>
+              <a:rPr lang="en-GB" dirty="0"/>
+              <a:t>improves teachers/instructors skills by sharing</a:t>
+            </a:r>
+            <a:r>
+              <a:rPr lang="pl-PL" dirty="0"/>
+              <a:t> ideas</a:t>
+            </a:r>
             <a:endParaRPr lang="en-GB" dirty="0"/>
           </a:p>
         </p:txBody>
@@ -6443,7 +6782,7 @@
     </p:spTree>
     <p:extLst>
       <p:ext uri="{BB962C8B-B14F-4D97-AF65-F5344CB8AC3E}">
-        <p14:creationId xmlns:p14="http://schemas.microsoft.com/office/powerpoint/2010/main" val="2238659949"/>
+        <p14:creationId xmlns:p14="http://schemas.microsoft.com/office/powerpoint/2010/main" val="3161521187"/>
       </p:ext>
     </p:extLst>
   </p:cSld>
@@ -6520,72 +6859,16 @@
         </p:nvSpPr>
         <p:spPr/>
         <p:txBody>
-          <a:bodyPr>
-            <a:normAutofit/>
-          </a:bodyPr>
-          <a:lstStyle/>
-          <a:p>
-            <a:r>
-              <a:rPr lang="pl-PL" dirty="0"/>
-              <a:t>Collaboration</a:t>
-            </a:r>
-          </a:p>
-          <a:p>
-            <a:r>
-              <a:rPr lang="pl-PL" dirty="0"/>
-              <a:t>Speed</a:t>
-            </a:r>
-          </a:p>
-          <a:p>
-            <a:r>
-              <a:rPr lang="pl-PL" dirty="0" err="1"/>
-              <a:t>Unpulished</a:t>
-            </a:r>
-            <a:r>
-              <a:rPr lang="pl-PL" dirty="0"/>
-              <a:t>/</a:t>
-            </a:r>
-            <a:r>
-              <a:rPr lang="pl-PL" dirty="0" err="1"/>
-              <a:t>negative</a:t>
-            </a:r>
-            <a:r>
-              <a:rPr lang="pl-PL" dirty="0"/>
-              <a:t> results</a:t>
-            </a:r>
-          </a:p>
-          <a:p>
-            <a:r>
-              <a:rPr lang="pl-PL" dirty="0"/>
-              <a:t>Re-use</a:t>
-            </a:r>
-          </a:p>
-          <a:p>
-            <a:r>
-              <a:rPr lang="pl-PL" dirty="0"/>
-              <a:t>Learn by example</a:t>
-            </a:r>
-          </a:p>
-          <a:p>
-            <a:r>
-              <a:rPr lang="pl-PL" dirty="0"/>
-              <a:t>Feedback</a:t>
-            </a:r>
-          </a:p>
-          <a:p>
-            <a:endParaRPr lang="pl-PL" dirty="0"/>
-          </a:p>
-          <a:p>
-            <a:endParaRPr lang="pl-PL" dirty="0"/>
-          </a:p>
-          <a:p>
-            <a:endParaRPr lang="pl-PL" dirty="0"/>
-          </a:p>
+          <a:bodyPr/>
+          <a:lstStyle/>
           <a:p>
             <a:pPr marL="0" indent="0">
               <a:buNone/>
             </a:pPr>
-            <a:endParaRPr lang="en-GB" dirty="0"/>
+            <a:r>
+              <a:rPr lang="en-GB" dirty="0"/>
+              <a:t>Exercise</a:t>
+            </a:r>
           </a:p>
           <a:p>
             <a:endParaRPr lang="en-GB" dirty="0"/>
@@ -6595,7 +6878,7 @@
     </p:spTree>
     <p:extLst>
       <p:ext uri="{BB962C8B-B14F-4D97-AF65-F5344CB8AC3E}">
-        <p14:creationId xmlns:p14="http://schemas.microsoft.com/office/powerpoint/2010/main" val="3667307836"/>
+        <p14:creationId xmlns:p14="http://schemas.microsoft.com/office/powerpoint/2010/main" val="2238659949"/>
       </p:ext>
     </p:extLst>
   </p:cSld>

</xml_diff>

<commit_message>
updated slides order and where to next links
</commit_message>
<xml_diff>
--- a/instructors/OS_Episode_v1.0.pptx
+++ b/instructors/OS_Episode_v1.0.pptx
@@ -12,11 +12,11 @@
     <p:sldId id="320" r:id="rId6"/>
     <p:sldId id="261" r:id="rId7"/>
     <p:sldId id="259" r:id="rId8"/>
-    <p:sldId id="257" r:id="rId9"/>
-    <p:sldId id="262" r:id="rId10"/>
-    <p:sldId id="322" r:id="rId11"/>
-    <p:sldId id="263" r:id="rId12"/>
-    <p:sldId id="311" r:id="rId13"/>
+    <p:sldId id="311" r:id="rId9"/>
+    <p:sldId id="328" r:id="rId10"/>
+    <p:sldId id="262" r:id="rId11"/>
+    <p:sldId id="322" r:id="rId12"/>
+    <p:sldId id="263" r:id="rId13"/>
     <p:sldId id="309" r:id="rId14"/>
     <p:sldId id="310" r:id="rId15"/>
     <p:sldId id="312" r:id="rId16"/>
@@ -285,7 +285,7 @@
           <a:p>
             <a:fld id="{41BDB93A-9A91-4ACD-99A9-997668C686B7}" type="datetimeFigureOut">
               <a:rPr lang="en-GB" smtClean="0"/>
-              <a:t>28/09/2021</a:t>
+              <a:t>29/09/2021</a:t>
             </a:fld>
             <a:endParaRPr lang="en-GB"/>
           </a:p>
@@ -485,7 +485,7 @@
           <a:p>
             <a:fld id="{41BDB93A-9A91-4ACD-99A9-997668C686B7}" type="datetimeFigureOut">
               <a:rPr lang="en-GB" smtClean="0"/>
-              <a:t>28/09/2021</a:t>
+              <a:t>29/09/2021</a:t>
             </a:fld>
             <a:endParaRPr lang="en-GB"/>
           </a:p>
@@ -695,7 +695,7 @@
           <a:p>
             <a:fld id="{41BDB93A-9A91-4ACD-99A9-997668C686B7}" type="datetimeFigureOut">
               <a:rPr lang="en-GB" smtClean="0"/>
-              <a:t>28/09/2021</a:t>
+              <a:t>29/09/2021</a:t>
             </a:fld>
             <a:endParaRPr lang="en-GB"/>
           </a:p>
@@ -895,7 +895,7 @@
           <a:p>
             <a:fld id="{41BDB93A-9A91-4ACD-99A9-997668C686B7}" type="datetimeFigureOut">
               <a:rPr lang="en-GB" smtClean="0"/>
-              <a:t>28/09/2021</a:t>
+              <a:t>29/09/2021</a:t>
             </a:fld>
             <a:endParaRPr lang="en-GB"/>
           </a:p>
@@ -1171,7 +1171,7 @@
           <a:p>
             <a:fld id="{41BDB93A-9A91-4ACD-99A9-997668C686B7}" type="datetimeFigureOut">
               <a:rPr lang="en-GB" smtClean="0"/>
-              <a:t>28/09/2021</a:t>
+              <a:t>29/09/2021</a:t>
             </a:fld>
             <a:endParaRPr lang="en-GB"/>
           </a:p>
@@ -1439,7 +1439,7 @@
           <a:p>
             <a:fld id="{41BDB93A-9A91-4ACD-99A9-997668C686B7}" type="datetimeFigureOut">
               <a:rPr lang="en-GB" smtClean="0"/>
-              <a:t>28/09/2021</a:t>
+              <a:t>29/09/2021</a:t>
             </a:fld>
             <a:endParaRPr lang="en-GB"/>
           </a:p>
@@ -1854,7 +1854,7 @@
           <a:p>
             <a:fld id="{41BDB93A-9A91-4ACD-99A9-997668C686B7}" type="datetimeFigureOut">
               <a:rPr lang="en-GB" smtClean="0"/>
-              <a:t>28/09/2021</a:t>
+              <a:t>29/09/2021</a:t>
             </a:fld>
             <a:endParaRPr lang="en-GB"/>
           </a:p>
@@ -1996,7 +1996,7 @@
           <a:p>
             <a:fld id="{41BDB93A-9A91-4ACD-99A9-997668C686B7}" type="datetimeFigureOut">
               <a:rPr lang="en-GB" smtClean="0"/>
-              <a:t>28/09/2021</a:t>
+              <a:t>29/09/2021</a:t>
             </a:fld>
             <a:endParaRPr lang="en-GB"/>
           </a:p>
@@ -2109,7 +2109,7 @@
           <a:p>
             <a:fld id="{41BDB93A-9A91-4ACD-99A9-997668C686B7}" type="datetimeFigureOut">
               <a:rPr lang="en-GB" smtClean="0"/>
-              <a:t>28/09/2021</a:t>
+              <a:t>29/09/2021</a:t>
             </a:fld>
             <a:endParaRPr lang="en-GB"/>
           </a:p>
@@ -2422,7 +2422,7 @@
           <a:p>
             <a:fld id="{41BDB93A-9A91-4ACD-99A9-997668C686B7}" type="datetimeFigureOut">
               <a:rPr lang="en-GB" smtClean="0"/>
-              <a:t>28/09/2021</a:t>
+              <a:t>29/09/2021</a:t>
             </a:fld>
             <a:endParaRPr lang="en-GB"/>
           </a:p>
@@ -2711,7 +2711,7 @@
           <a:p>
             <a:fld id="{41BDB93A-9A91-4ACD-99A9-997668C686B7}" type="datetimeFigureOut">
               <a:rPr lang="en-GB" smtClean="0"/>
-              <a:t>28/09/2021</a:t>
+              <a:t>29/09/2021</a:t>
             </a:fld>
             <a:endParaRPr lang="en-GB"/>
           </a:p>
@@ -2954,7 +2954,7 @@
           <a:p>
             <a:fld id="{41BDB93A-9A91-4ACD-99A9-997668C686B7}" type="datetimeFigureOut">
               <a:rPr lang="en-GB" smtClean="0"/>
-              <a:t>28/09/2021</a:t>
+              <a:t>29/09/2021</a:t>
             </a:fld>
             <a:endParaRPr lang="en-GB"/>
           </a:p>
@@ -3511,72 +3511,16 @@
         </p:nvSpPr>
         <p:spPr/>
         <p:txBody>
-          <a:bodyPr>
-            <a:normAutofit/>
-          </a:bodyPr>
-          <a:lstStyle/>
-          <a:p>
-            <a:r>
-              <a:rPr lang="pl-PL" dirty="0"/>
-              <a:t>Collaboration</a:t>
-            </a:r>
-          </a:p>
-          <a:p>
-            <a:r>
-              <a:rPr lang="pl-PL" dirty="0"/>
-              <a:t>Speed</a:t>
-            </a:r>
-          </a:p>
-          <a:p>
-            <a:r>
-              <a:rPr lang="pl-PL" dirty="0" err="1"/>
-              <a:t>Unpulished</a:t>
-            </a:r>
-            <a:r>
-              <a:rPr lang="pl-PL" dirty="0"/>
-              <a:t>/</a:t>
-            </a:r>
-            <a:r>
-              <a:rPr lang="pl-PL" dirty="0" err="1"/>
-              <a:t>negative</a:t>
-            </a:r>
-            <a:r>
-              <a:rPr lang="pl-PL" dirty="0"/>
-              <a:t> results</a:t>
-            </a:r>
-          </a:p>
-          <a:p>
-            <a:r>
-              <a:rPr lang="pl-PL" dirty="0"/>
-              <a:t>Re-use</a:t>
-            </a:r>
-          </a:p>
-          <a:p>
-            <a:r>
-              <a:rPr lang="pl-PL" dirty="0"/>
-              <a:t>Learn by example</a:t>
-            </a:r>
-          </a:p>
-          <a:p>
-            <a:r>
-              <a:rPr lang="pl-PL" dirty="0"/>
-              <a:t>Feedback</a:t>
-            </a:r>
-          </a:p>
-          <a:p>
-            <a:endParaRPr lang="pl-PL" dirty="0"/>
-          </a:p>
-          <a:p>
-            <a:endParaRPr lang="pl-PL" dirty="0"/>
-          </a:p>
-          <a:p>
-            <a:endParaRPr lang="pl-PL" dirty="0"/>
-          </a:p>
+          <a:bodyPr/>
+          <a:lstStyle/>
           <a:p>
             <a:pPr marL="0" indent="0">
               <a:buNone/>
             </a:pPr>
-            <a:endParaRPr lang="en-GB" dirty="0"/>
+            <a:r>
+              <a:rPr lang="en-GB" dirty="0"/>
+              <a:t>Exercise</a:t>
+            </a:r>
           </a:p>
           <a:p>
             <a:endParaRPr lang="en-GB" dirty="0"/>
@@ -3586,7 +3530,7 @@
     </p:spTree>
     <p:extLst>
       <p:ext uri="{BB962C8B-B14F-4D97-AF65-F5344CB8AC3E}">
-        <p14:creationId xmlns:p14="http://schemas.microsoft.com/office/powerpoint/2010/main" val="3667307836"/>
+        <p14:creationId xmlns:p14="http://schemas.microsoft.com/office/powerpoint/2010/main" val="2238659949"/>
       </p:ext>
     </p:extLst>
   </p:cSld>
@@ -3618,7 +3562,7 @@
           <p:cNvPr id="2" name="Title 1">
             <a:extLst>
               <a:ext uri="{FF2B5EF4-FFF2-40B4-BE49-F238E27FC236}">
-                <a16:creationId xmlns:a16="http://schemas.microsoft.com/office/drawing/2014/main" id="{917BA876-9561-462B-89F2-FFD0BB8C58F1}"/>
+                <a16:creationId xmlns:a16="http://schemas.microsoft.com/office/drawing/2014/main" id="{BA9DA74F-73B3-421A-BD2A-363B267769ED}"/>
               </a:ext>
             </a:extLst>
           </p:cNvPr>
@@ -3635,8 +3579,12 @@
           <a:lstStyle/>
           <a:p>
             <a:r>
-              <a:rPr lang="en-GB" dirty="0"/>
-              <a:t>Open Science motivation: Money</a:t>
+              <a:rPr lang="pl-PL" dirty="0"/>
+              <a:t>Outcomes</a:t>
+            </a:r>
+            <a:r>
+              <a:rPr lang="en-GB" dirty="0"/>
+              <a:t> of Openness</a:t>
             </a:r>
           </a:p>
         </p:txBody>
@@ -3646,7 +3594,7 @@
           <p:cNvPr id="3" name="Content Placeholder 2">
             <a:extLst>
               <a:ext uri="{FF2B5EF4-FFF2-40B4-BE49-F238E27FC236}">
-                <a16:creationId xmlns:a16="http://schemas.microsoft.com/office/drawing/2014/main" id="{32BDDAC9-35A8-4328-B5EA-8844C448EBC3}"/>
+                <a16:creationId xmlns:a16="http://schemas.microsoft.com/office/drawing/2014/main" id="{D7A3F2CD-AB38-44C7-977C-EDF39BD02DB3}"/>
               </a:ext>
             </a:extLst>
           </p:cNvPr>
@@ -3660,17 +3608,65 @@
         <p:spPr/>
         <p:txBody>
           <a:bodyPr>
-            <a:normAutofit lnSpcReduction="10000"/>
+            <a:normAutofit/>
           </a:bodyPr>
           <a:lstStyle/>
           <a:p>
-            <a:pPr marL="0" indent="0">
-              <a:buNone/>
-            </a:pPr>
-            <a:r>
-              <a:rPr lang="en-GB" dirty="0"/>
-              <a:t>Scientific knowledge is a product of social collaboration and its ownership belongs to the community. </a:t>
-            </a:r>
+            <a:r>
+              <a:rPr lang="pl-PL" dirty="0"/>
+              <a:t>Collaboration</a:t>
+            </a:r>
+          </a:p>
+          <a:p>
+            <a:r>
+              <a:rPr lang="pl-PL" dirty="0"/>
+              <a:t>Speed</a:t>
+            </a:r>
+          </a:p>
+          <a:p>
+            <a:r>
+              <a:rPr lang="pl-PL" dirty="0" err="1"/>
+              <a:t>Unpulished</a:t>
+            </a:r>
+            <a:r>
+              <a:rPr lang="pl-PL" dirty="0"/>
+              <a:t>/</a:t>
+            </a:r>
+            <a:r>
+              <a:rPr lang="pl-PL" dirty="0" err="1"/>
+              <a:t>negative</a:t>
+            </a:r>
+            <a:r>
+              <a:rPr lang="pl-PL" dirty="0"/>
+              <a:t> results</a:t>
+            </a:r>
+          </a:p>
+          <a:p>
+            <a:r>
+              <a:rPr lang="pl-PL" dirty="0"/>
+              <a:t>Re-use</a:t>
+            </a:r>
+          </a:p>
+          <a:p>
+            <a:r>
+              <a:rPr lang="pl-PL" dirty="0"/>
+              <a:t>Learn by example</a:t>
+            </a:r>
+          </a:p>
+          <a:p>
+            <a:r>
+              <a:rPr lang="pl-PL" dirty="0"/>
+              <a:t>Feedback</a:t>
+            </a:r>
+          </a:p>
+          <a:p>
+            <a:endParaRPr lang="pl-PL" dirty="0"/>
+          </a:p>
+          <a:p>
+            <a:endParaRPr lang="pl-PL" dirty="0"/>
+          </a:p>
+          <a:p>
+            <a:endParaRPr lang="pl-PL" dirty="0"/>
           </a:p>
           <a:p>
             <a:pPr marL="0" indent="0">
@@ -3679,55 +3675,14 @@
             <a:endParaRPr lang="en-GB" dirty="0"/>
           </a:p>
           <a:p>
-            <a:pPr marL="0" indent="0">
-              <a:buNone/>
-            </a:pPr>
-            <a:r>
-              <a:rPr lang="en-GB" dirty="0"/>
-              <a:t>From an economic point of view, scientific outputs generated by public research are a public good that everyone should be able to use at no cost.</a:t>
-            </a:r>
-          </a:p>
-          <a:p>
-            <a:pPr marL="0" indent="0">
-              <a:buNone/>
-            </a:pPr>
             <a:endParaRPr lang="en-GB" dirty="0"/>
-          </a:p>
-          <a:p>
-            <a:pPr marL="0" indent="0">
-              <a:buNone/>
-            </a:pPr>
-            <a:r>
-              <a:rPr lang="en-GB" dirty="0"/>
-              <a:t>€10.2bn lost every year because of not accessible data</a:t>
-            </a:r>
-            <a:br>
-              <a:rPr lang="en-GB" dirty="0"/>
-            </a:br>
-            <a:r>
-              <a:rPr lang="en-GB" dirty="0"/>
-              <a:t>(plus additional 16bn if accounting for re-use and research quality).</a:t>
-            </a:r>
-            <a:br>
-              <a:rPr lang="en-GB" dirty="0"/>
-            </a:br>
-            <a:endParaRPr lang="en-GB" sz="1600" dirty="0"/>
-          </a:p>
-          <a:p>
-            <a:pPr marL="0" indent="0">
-              <a:buNone/>
-            </a:pPr>
-            <a:r>
-              <a:rPr lang="en-GB" sz="1600" dirty="0"/>
-              <a:t>Source: Credits [2]</a:t>
-            </a:r>
           </a:p>
         </p:txBody>
       </p:sp>
     </p:spTree>
     <p:extLst>
       <p:ext uri="{BB962C8B-B14F-4D97-AF65-F5344CB8AC3E}">
-        <p14:creationId xmlns:p14="http://schemas.microsoft.com/office/powerpoint/2010/main" val="3400150690"/>
+        <p14:creationId xmlns:p14="http://schemas.microsoft.com/office/powerpoint/2010/main" val="3667307836"/>
       </p:ext>
     </p:extLst>
   </p:cSld>
@@ -3759,7 +3714,7 @@
           <p:cNvPr id="2" name="Title 1">
             <a:extLst>
               <a:ext uri="{FF2B5EF4-FFF2-40B4-BE49-F238E27FC236}">
-                <a16:creationId xmlns:a16="http://schemas.microsoft.com/office/drawing/2014/main" id="{ECA7A994-C089-42CD-8B95-C23459559029}"/>
+                <a16:creationId xmlns:a16="http://schemas.microsoft.com/office/drawing/2014/main" id="{917BA876-9561-462B-89F2-FFD0BB8C58F1}"/>
               </a:ext>
             </a:extLst>
           </p:cNvPr>
@@ -3777,7 +3732,7 @@
           <a:p>
             <a:r>
               <a:rPr lang="en-GB" dirty="0"/>
-              <a:t>Success story – Open Access</a:t>
+              <a:t>Open Science motivation: Money</a:t>
             </a:r>
           </a:p>
         </p:txBody>
@@ -3787,7 +3742,7 @@
           <p:cNvPr id="3" name="Content Placeholder 2">
             <a:extLst>
               <a:ext uri="{FF2B5EF4-FFF2-40B4-BE49-F238E27FC236}">
-                <a16:creationId xmlns:a16="http://schemas.microsoft.com/office/drawing/2014/main" id="{042518E7-2BC9-4C7D-A75B-C2FBC33E1E6B}"/>
+                <a16:creationId xmlns:a16="http://schemas.microsoft.com/office/drawing/2014/main" id="{32BDDAC9-35A8-4328-B5EA-8844C448EBC3}"/>
               </a:ext>
             </a:extLst>
           </p:cNvPr>
@@ -3801,7 +3756,7 @@
         <p:spPr/>
         <p:txBody>
           <a:bodyPr>
-            <a:normAutofit fontScale="92500"/>
+            <a:normAutofit lnSpcReduction="10000"/>
           </a:bodyPr>
           <a:lstStyle/>
           <a:p>
@@ -3810,45 +3765,12 @@
             </a:pPr>
             <a:r>
               <a:rPr lang="en-GB" dirty="0"/>
-              <a:t>The initiative to move to Open Access publishing is known as Plan S</a:t>
-            </a:r>
-          </a:p>
-          <a:p>
-            <a:endParaRPr lang="en-GB" dirty="0"/>
+              <a:t>Scientific knowledge is a product of social collaboration and its ownership belongs to the community. </a:t>
+            </a:r>
           </a:p>
           <a:p>
             <a:pPr marL="0" indent="0">
               <a:buNone/>
-            </a:pPr>
-            <a:r>
-              <a:rPr lang="en-GB" dirty="0"/>
-              <a:t>Publications available immediately and under open licences, either in:</a:t>
-            </a:r>
-          </a:p>
-          <a:p>
-            <a:pPr>
-              <a:buFontTx/>
-              <a:buChar char="-"/>
-            </a:pPr>
-            <a:r>
-              <a:rPr lang="en-GB" dirty="0"/>
-              <a:t>quality Open Access platforms or journals</a:t>
-            </a:r>
-          </a:p>
-          <a:p>
-            <a:pPr>
-              <a:buFontTx/>
-              <a:buChar char="-"/>
-            </a:pPr>
-            <a:r>
-              <a:rPr lang="en-GB" dirty="0"/>
-              <a:t>as a copy deposited with your home institution.</a:t>
-            </a:r>
-          </a:p>
-          <a:p>
-            <a:pPr>
-              <a:buFontTx/>
-              <a:buChar char="-"/>
             </a:pPr>
             <a:endParaRPr lang="en-GB" dirty="0"/>
           </a:p>
@@ -3858,82 +3780,50 @@
             </a:pPr>
             <a:r>
               <a:rPr lang="en-GB" dirty="0"/>
-              <a:t>Details of funding bodies requirements can be found at </a:t>
-            </a:r>
-            <a:r>
-              <a:rPr lang="en-GB" dirty="0">
-                <a:hlinkClick r:id="rId2"/>
-              </a:rPr>
-              <a:t>Plan S/</a:t>
-            </a:r>
-            <a:r>
-              <a:rPr lang="en-GB" dirty="0" err="1">
-                <a:hlinkClick r:id="rId2"/>
-              </a:rPr>
-              <a:t>cOAlition</a:t>
-            </a:r>
-            <a:r>
-              <a:rPr lang="en-GB" dirty="0">
-                <a:hlinkClick r:id="rId2"/>
-              </a:rPr>
-              <a:t> S</a:t>
-            </a:r>
-            <a:r>
-              <a:rPr lang="en-GB" dirty="0"/>
-              <a:t>. </a:t>
-            </a:r>
-          </a:p>
-          <a:p>
-            <a:pPr>
-              <a:buFontTx/>
-              <a:buChar char="-"/>
+              <a:t>From an economic point of view, scientific outputs generated by public research are a public good that everyone should be able to use at no cost.</a:t>
+            </a:r>
+          </a:p>
+          <a:p>
+            <a:pPr marL="0" indent="0">
+              <a:buNone/>
             </a:pPr>
-            <a:r>
-              <a:rPr lang="en-GB" dirty="0" err="1">
-                <a:hlinkClick r:id="rId3"/>
-              </a:rPr>
-              <a:t>cOAlition</a:t>
-            </a:r>
-            <a:r>
-              <a:rPr lang="en-GB" dirty="0">
-                <a:hlinkClick r:id="rId3"/>
-              </a:rPr>
-              <a:t> S journal checker tool</a:t>
-            </a:r>
-            <a:r>
-              <a:rPr lang="en-GB" dirty="0"/>
-              <a:t> to assess compliance</a:t>
-            </a:r>
-          </a:p>
-          <a:p>
-            <a:pPr>
-              <a:buFontTx/>
-              <a:buChar char="-"/>
+            <a:endParaRPr lang="en-GB" dirty="0"/>
+          </a:p>
+          <a:p>
+            <a:pPr marL="0" indent="0">
+              <a:buNone/>
             </a:pPr>
             <a:r>
               <a:rPr lang="en-GB" dirty="0"/>
-              <a:t>the </a:t>
-            </a:r>
-            <a:r>
-              <a:rPr lang="en-GB" dirty="0">
-                <a:hlinkClick r:id="rId4"/>
-              </a:rPr>
-              <a:t>Directory of Open Access Journals (DOAJ)</a:t>
-            </a:r>
-            <a:r>
-              <a:rPr lang="en-GB" dirty="0"/>
-              <a:t> helps finding OA journals</a:t>
-            </a:r>
-          </a:p>
-          <a:p>
-            <a:endParaRPr lang="en-GB" dirty="0"/>
+              <a:t>€10.2bn lost every year because of not accessible data</a:t>
+            </a:r>
+            <a:br>
+              <a:rPr lang="en-GB" dirty="0"/>
+            </a:br>
+            <a:r>
+              <a:rPr lang="en-GB" dirty="0"/>
+              <a:t>(plus additional 16bn if accounting for re-use and research quality).</a:t>
+            </a:r>
+            <a:br>
+              <a:rPr lang="en-GB" dirty="0"/>
+            </a:br>
+            <a:endParaRPr lang="en-GB" sz="1600" dirty="0"/>
+          </a:p>
+          <a:p>
+            <a:pPr marL="0" indent="0">
+              <a:buNone/>
+            </a:pPr>
+            <a:r>
+              <a:rPr lang="en-GB" sz="1600" dirty="0"/>
+              <a:t>Source: Credits [2]</a:t>
+            </a:r>
           </a:p>
         </p:txBody>
       </p:sp>
     </p:spTree>
     <p:extLst>
       <p:ext uri="{BB962C8B-B14F-4D97-AF65-F5344CB8AC3E}">
-        <p14:creationId xmlns:p14="http://schemas.microsoft.com/office/powerpoint/2010/main" val="1168511892"/>
+        <p14:creationId xmlns:p14="http://schemas.microsoft.com/office/powerpoint/2010/main" val="3400150690"/>
       </p:ext>
     </p:extLst>
   </p:cSld>
@@ -5043,12 +4933,12 @@
           <a:lstStyle/>
           <a:p>
             <a:r>
-              <a:rPr lang="pl-PL" dirty="0"/>
-              <a:t>(Optional) </a:t>
-            </a:r>
-            <a:r>
-              <a:rPr lang="en-GB" dirty="0"/>
-              <a:t>Intellectual property</a:t>
+              <a:rPr lang="en-GB" dirty="0" smtClean="0"/>
+              <a:t>Intellectual </a:t>
+            </a:r>
+            <a:r>
+              <a:rPr lang="en-GB" dirty="0"/>
+              <a:t>property</a:t>
             </a:r>
             <a:r>
               <a:rPr lang="pl-PL" dirty="0"/>
@@ -5170,12 +5060,12 @@
           <a:lstStyle/>
           <a:p>
             <a:r>
-              <a:rPr lang="pl-PL" dirty="0"/>
-              <a:t>(Optional) </a:t>
-            </a:r>
-            <a:r>
-              <a:rPr lang="en-GB" dirty="0"/>
-              <a:t>Intellectual property</a:t>
+              <a:rPr lang="en-GB" dirty="0" smtClean="0"/>
+              <a:t>Intellectual </a:t>
+            </a:r>
+            <a:r>
+              <a:rPr lang="en-GB" dirty="0"/>
+              <a:t>property</a:t>
             </a:r>
             <a:r>
               <a:rPr lang="pl-PL" dirty="0"/>
@@ -5298,12 +5188,12 @@
           <a:lstStyle/>
           <a:p>
             <a:r>
-              <a:rPr lang="pl-PL" dirty="0"/>
-              <a:t>(Optional) </a:t>
-            </a:r>
-            <a:r>
-              <a:rPr lang="en-GB" dirty="0"/>
-              <a:t>Intellectual property</a:t>
+              <a:rPr lang="en-GB" dirty="0" smtClean="0"/>
+              <a:t>Intellectual </a:t>
+            </a:r>
+            <a:r>
+              <a:rPr lang="en-GB" dirty="0"/>
+              <a:t>property</a:t>
             </a:r>
             <a:r>
               <a:rPr lang="pl-PL" dirty="0"/>
@@ -5629,10 +5519,102 @@
           <a:bodyPr/>
           <a:lstStyle/>
           <a:p>
-            <a:r>
-              <a:rPr lang="en-GB" dirty="0"/>
-              <a:t>…</a:t>
-            </a:r>
+            <a:endParaRPr lang="en-GB" dirty="0"/>
+          </a:p>
+          <a:p>
+            <a:r>
+              <a:rPr lang="en-GB" dirty="0"/>
+              <a:t>    Challenges &amp; benefits of </a:t>
+            </a:r>
+            <a:r>
+              <a:rPr lang="en-GB" dirty="0" smtClean="0"/>
+              <a:t>OS</a:t>
+            </a:r>
+            <a:r>
+              <a:rPr lang="pl-PL" dirty="0" smtClean="0"/>
+              <a:t> </a:t>
+            </a:r>
+            <a:r>
+              <a:rPr lang="en-GB" dirty="0">
+                <a:hlinkClick r:id="rId2"/>
+              </a:rPr>
+              <a:t>https://doi.org/10.1371/journal.pbio.3000246</a:t>
+            </a:r>
+            <a:endParaRPr lang="en-GB" dirty="0"/>
+          </a:p>
+          <a:p>
+            <a:r>
+              <a:rPr lang="en-GB" dirty="0"/>
+              <a:t>    Centre for Open </a:t>
+            </a:r>
+            <a:r>
+              <a:rPr lang="en-GB" dirty="0" smtClean="0"/>
+              <a:t>Science</a:t>
+            </a:r>
+            <a:r>
+              <a:rPr lang="pl-PL" dirty="0"/>
+              <a:t> </a:t>
+            </a:r>
+            <a:br>
+              <a:rPr lang="pl-PL" dirty="0"/>
+            </a:br>
+            <a:r>
+              <a:rPr lang="pl-PL" dirty="0" smtClean="0">
+                <a:hlinkClick r:id="rId3"/>
+              </a:rPr>
+              <a:t>https</a:t>
+            </a:r>
+            <a:r>
+              <a:rPr lang="pl-PL" dirty="0">
+                <a:hlinkClick r:id="rId3"/>
+              </a:rPr>
+              <a:t>://www.cos.io</a:t>
+            </a:r>
+            <a:r>
+              <a:rPr lang="pl-PL" dirty="0" smtClean="0">
+                <a:hlinkClick r:id="rId3"/>
+              </a:rPr>
+              <a:t>/</a:t>
+            </a:r>
+            <a:r>
+              <a:rPr lang="pl-PL" dirty="0" smtClean="0"/>
+              <a:t> </a:t>
+            </a:r>
+            <a:endParaRPr lang="en-GB" dirty="0"/>
+          </a:p>
+          <a:p>
+            <a:r>
+              <a:rPr lang="en-GB" dirty="0"/>
+              <a:t>    Ted talk supporting </a:t>
+            </a:r>
+            <a:r>
+              <a:rPr lang="en-GB" dirty="0" smtClean="0"/>
+              <a:t>OS</a:t>
+            </a:r>
+            <a:r>
+              <a:rPr lang="pl-PL" dirty="0"/>
+              <a:t/>
+            </a:r>
+            <a:br>
+              <a:rPr lang="pl-PL" dirty="0"/>
+            </a:br>
+            <a:r>
+              <a:rPr lang="pl-PL" dirty="0">
+                <a:hlinkClick r:id="rId4"/>
+              </a:rPr>
+              <a:t>https://</a:t>
+            </a:r>
+            <a:r>
+              <a:rPr lang="pl-PL" dirty="0" smtClean="0">
+                <a:hlinkClick r:id="rId4"/>
+              </a:rPr>
+              <a:t>youtu.be/c-bemNZ-IqA</a:t>
+            </a:r>
+            <a:r>
+              <a:rPr lang="pl-PL" dirty="0" smtClean="0"/>
+              <a:t> </a:t>
+            </a:r>
+            <a:endParaRPr lang="en-GB" dirty="0"/>
           </a:p>
         </p:txBody>
       </p:sp>
@@ -6698,7 +6680,7 @@
           <p:cNvPr id="2" name="Title 1">
             <a:extLst>
               <a:ext uri="{FF2B5EF4-FFF2-40B4-BE49-F238E27FC236}">
-                <a16:creationId xmlns:a16="http://schemas.microsoft.com/office/drawing/2014/main" id="{BA9DA74F-73B3-421A-BD2A-363B267769ED}"/>
+                <a16:creationId xmlns:a16="http://schemas.microsoft.com/office/drawing/2014/main" id="{ECA7A994-C089-42CD-8B95-C23459559029}"/>
               </a:ext>
             </a:extLst>
           </p:cNvPr>
@@ -6715,12 +6697,8 @@
           <a:lstStyle/>
           <a:p>
             <a:r>
-              <a:rPr lang="pl-PL" dirty="0"/>
-              <a:t>Outcomes</a:t>
-            </a:r>
-            <a:r>
-              <a:rPr lang="en-GB" dirty="0"/>
-              <a:t> of Openness</a:t>
+              <a:rPr lang="en-GB" dirty="0"/>
+              <a:t>Success story – Open Access</a:t>
             </a:r>
           </a:p>
         </p:txBody>
@@ -6730,7 +6708,7 @@
           <p:cNvPr id="3" name="Content Placeholder 2">
             <a:extLst>
               <a:ext uri="{FF2B5EF4-FFF2-40B4-BE49-F238E27FC236}">
-                <a16:creationId xmlns:a16="http://schemas.microsoft.com/office/drawing/2014/main" id="{D7A3F2CD-AB38-44C7-977C-EDF39BD02DB3}"/>
+                <a16:creationId xmlns:a16="http://schemas.microsoft.com/office/drawing/2014/main" id="{042518E7-2BC9-4C7D-A75B-C2FBC33E1E6B}"/>
               </a:ext>
             </a:extLst>
           </p:cNvPr>
@@ -6743,13 +6721,21 @@
         </p:nvSpPr>
         <p:spPr/>
         <p:txBody>
-          <a:bodyPr/>
+          <a:bodyPr>
+            <a:normAutofit fontScale="92500"/>
+          </a:bodyPr>
           <a:lstStyle/>
           <a:p>
             <a:pPr marL="0" indent="0">
               <a:buNone/>
             </a:pPr>
-            <a:endParaRPr lang="pl-PL" dirty="0"/>
+            <a:r>
+              <a:rPr lang="en-GB" dirty="0"/>
+              <a:t>The initiative to move to Open Access publishing is known as Plan S</a:t>
+            </a:r>
+          </a:p>
+          <a:p>
+            <a:endParaRPr lang="en-GB" dirty="0"/>
           </a:p>
           <a:p>
             <a:pPr marL="0" indent="0">
@@ -6757,24 +6743,110 @@
             </a:pPr>
             <a:r>
               <a:rPr lang="en-GB" dirty="0"/>
-              <a:t>Open educational resources:</a:t>
-            </a:r>
-          </a:p>
-          <a:p>
-            <a:r>
-              <a:rPr lang="en-GB" dirty="0"/>
-              <a:t>enables collaborative development of courses</a:t>
-            </a:r>
-          </a:p>
-          <a:p>
-            <a:r>
-              <a:rPr lang="en-GB" dirty="0"/>
-              <a:t>improves teachers/instructors skills by sharing</a:t>
-            </a:r>
-            <a:r>
-              <a:rPr lang="pl-PL" dirty="0"/>
-              <a:t> ideas</a:t>
-            </a:r>
+              <a:t>Publications available immediately and under open licences, either in:</a:t>
+            </a:r>
+          </a:p>
+          <a:p>
+            <a:pPr>
+              <a:buFontTx/>
+              <a:buChar char="-"/>
+            </a:pPr>
+            <a:r>
+              <a:rPr lang="en-GB" dirty="0"/>
+              <a:t>quality Open Access platforms or journals</a:t>
+            </a:r>
+          </a:p>
+          <a:p>
+            <a:pPr>
+              <a:buFontTx/>
+              <a:buChar char="-"/>
+            </a:pPr>
+            <a:r>
+              <a:rPr lang="en-GB" dirty="0"/>
+              <a:t>as a copy deposited with your home institution.</a:t>
+            </a:r>
+          </a:p>
+          <a:p>
+            <a:pPr>
+              <a:buFontTx/>
+              <a:buChar char="-"/>
+            </a:pPr>
+            <a:endParaRPr lang="en-GB" dirty="0"/>
+          </a:p>
+          <a:p>
+            <a:pPr marL="0" indent="0">
+              <a:buNone/>
+            </a:pPr>
+            <a:r>
+              <a:rPr lang="en-GB" dirty="0"/>
+              <a:t>Details of funding bodies requirements can be found at </a:t>
+            </a:r>
+            <a:r>
+              <a:rPr lang="en-GB" dirty="0">
+                <a:hlinkClick r:id="rId2"/>
+              </a:rPr>
+              <a:t>Plan S/</a:t>
+            </a:r>
+            <a:r>
+              <a:rPr lang="en-GB" dirty="0" err="1">
+                <a:hlinkClick r:id="rId2"/>
+              </a:rPr>
+              <a:t>cOAlition</a:t>
+            </a:r>
+            <a:r>
+              <a:rPr lang="en-GB" dirty="0">
+                <a:hlinkClick r:id="rId2"/>
+              </a:rPr>
+              <a:t> S</a:t>
+            </a:r>
+            <a:r>
+              <a:rPr lang="en-GB" dirty="0"/>
+              <a:t>. </a:t>
+            </a:r>
+          </a:p>
+          <a:p>
+            <a:pPr>
+              <a:buFontTx/>
+              <a:buChar char="-"/>
+            </a:pPr>
+            <a:r>
+              <a:rPr lang="en-GB" dirty="0" err="1">
+                <a:hlinkClick r:id="rId3"/>
+              </a:rPr>
+              <a:t>cOAlition</a:t>
+            </a:r>
+            <a:r>
+              <a:rPr lang="en-GB" dirty="0">
+                <a:hlinkClick r:id="rId3"/>
+              </a:rPr>
+              <a:t> S journal checker tool</a:t>
+            </a:r>
+            <a:r>
+              <a:rPr lang="en-GB" dirty="0"/>
+              <a:t> to assess compliance</a:t>
+            </a:r>
+          </a:p>
+          <a:p>
+            <a:pPr>
+              <a:buFontTx/>
+              <a:buChar char="-"/>
+            </a:pPr>
+            <a:r>
+              <a:rPr lang="en-GB" dirty="0"/>
+              <a:t>the </a:t>
+            </a:r>
+            <a:r>
+              <a:rPr lang="en-GB" dirty="0">
+                <a:hlinkClick r:id="rId4"/>
+              </a:rPr>
+              <a:t>Directory of Open Access Journals (DOAJ)</a:t>
+            </a:r>
+            <a:r>
+              <a:rPr lang="en-GB" dirty="0"/>
+              <a:t> helps finding OA journals</a:t>
+            </a:r>
+          </a:p>
+          <a:p>
             <a:endParaRPr lang="en-GB" dirty="0"/>
           </a:p>
         </p:txBody>
@@ -6782,7 +6854,7 @@
     </p:spTree>
     <p:extLst>
       <p:ext uri="{BB962C8B-B14F-4D97-AF65-F5344CB8AC3E}">
-        <p14:creationId xmlns:p14="http://schemas.microsoft.com/office/powerpoint/2010/main" val="3161521187"/>
+        <p14:creationId xmlns:p14="http://schemas.microsoft.com/office/powerpoint/2010/main" val="1168511892"/>
       </p:ext>
     </p:extLst>
   </p:cSld>
@@ -6859,15 +6931,116 @@
         </p:nvSpPr>
         <p:spPr/>
         <p:txBody>
-          <a:bodyPr/>
+          <a:bodyPr>
+            <a:normAutofit lnSpcReduction="10000"/>
+          </a:bodyPr>
           <a:lstStyle/>
           <a:p>
             <a:pPr marL="0" indent="0">
               <a:buNone/>
             </a:pPr>
-            <a:r>
-              <a:rPr lang="en-GB" dirty="0"/>
-              <a:t>Exercise</a:t>
+            <a:endParaRPr lang="pl-PL" dirty="0"/>
+          </a:p>
+          <a:p>
+            <a:pPr marL="0" indent="0">
+              <a:buNone/>
+            </a:pPr>
+            <a:r>
+              <a:rPr lang="en-GB" dirty="0"/>
+              <a:t>Open </a:t>
+            </a:r>
+            <a:r>
+              <a:rPr lang="pl-PL" dirty="0" smtClean="0"/>
+              <a:t>Access</a:t>
+            </a:r>
+            <a:r>
+              <a:rPr lang="en-GB" dirty="0" smtClean="0"/>
+              <a:t>:</a:t>
+            </a:r>
+            <a:endParaRPr lang="en-GB" dirty="0"/>
+          </a:p>
+          <a:p>
+            <a:endParaRPr lang="en-GB" dirty="0"/>
+          </a:p>
+          <a:p>
+            <a:r>
+              <a:rPr lang="en-GB" dirty="0" smtClean="0"/>
+              <a:t>speed </a:t>
+            </a:r>
+            <a:r>
+              <a:rPr lang="en-GB" dirty="0"/>
+              <a:t>of </a:t>
+            </a:r>
+            <a:r>
+              <a:rPr lang="pl-PL" dirty="0" smtClean="0"/>
+              <a:t>work and </a:t>
+            </a:r>
+            <a:r>
+              <a:rPr lang="en-GB" dirty="0" smtClean="0"/>
+              <a:t>knowledge </a:t>
+            </a:r>
+            <a:r>
+              <a:rPr lang="en-GB" dirty="0"/>
+              <a:t>distribution</a:t>
+            </a:r>
+          </a:p>
+          <a:p>
+            <a:r>
+              <a:rPr lang="en-GB" dirty="0" smtClean="0"/>
+              <a:t>levelling </a:t>
+            </a:r>
+            <a:r>
+              <a:rPr lang="en-GB" dirty="0"/>
+              <a:t>field for underfunded </a:t>
+            </a:r>
+            <a:r>
+              <a:rPr lang="en-GB" dirty="0" smtClean="0"/>
+              <a:t>sites</a:t>
+            </a:r>
+            <a:endParaRPr lang="en-GB" dirty="0"/>
+          </a:p>
+          <a:p>
+            <a:r>
+              <a:rPr lang="en-GB" dirty="0" smtClean="0"/>
+              <a:t>increasing </a:t>
+            </a:r>
+            <a:r>
+              <a:rPr lang="en-GB" dirty="0"/>
+              <a:t>chance for </a:t>
+            </a:r>
+            <a:r>
+              <a:rPr lang="pl-PL" dirty="0" smtClean="0"/>
+              <a:t>collaboration, </a:t>
+            </a:r>
+            <a:r>
+              <a:rPr lang="en-GB" dirty="0" smtClean="0"/>
+              <a:t>exposure </a:t>
+            </a:r>
+            <a:r>
+              <a:rPr lang="en-GB" dirty="0"/>
+              <a:t>&amp; </a:t>
+            </a:r>
+            <a:r>
+              <a:rPr lang="en-GB" dirty="0" smtClean="0"/>
+              <a:t>citations</a:t>
+            </a:r>
+            <a:endParaRPr lang="pl-PL" dirty="0" smtClean="0"/>
+          </a:p>
+          <a:p>
+            <a:r>
+              <a:rPr lang="pl-PL" dirty="0" smtClean="0"/>
+              <a:t>new metrics of impact: views, downloads, tweets etc</a:t>
+            </a:r>
+            <a:endParaRPr lang="en-GB" dirty="0"/>
+          </a:p>
+          <a:p>
+            <a:r>
+              <a:rPr lang="en-GB" dirty="0" smtClean="0"/>
+              <a:t>access </a:t>
+            </a:r>
+            <a:r>
+              <a:rPr lang="en-GB" dirty="0"/>
+              <a:t>to work by lay audiences, thus increases social exposure of research</a:t>
             </a:r>
           </a:p>
           <a:p>
@@ -6878,13 +7051,20 @@
     </p:spTree>
     <p:extLst>
       <p:ext uri="{BB962C8B-B14F-4D97-AF65-F5344CB8AC3E}">
-        <p14:creationId xmlns:p14="http://schemas.microsoft.com/office/powerpoint/2010/main" val="2238659949"/>
+        <p14:creationId xmlns:p14="http://schemas.microsoft.com/office/powerpoint/2010/main" val="3023348561"/>
       </p:ext>
     </p:extLst>
   </p:cSld>
   <p:clrMapOvr>
     <a:masterClrMapping/>
   </p:clrMapOvr>
+  <p:timing>
+    <p:tnLst>
+      <p:par>
+        <p:cTn id="1" dur="indefinite" restart="never" nodeType="tmRoot"/>
+      </p:par>
+    </p:tnLst>
+  </p:timing>
 </p:sld>
 </file>
 

</xml_diff>